<commit_message>
Commiting class presentation and arrows update
</commit_message>
<xml_diff>
--- a/activity/arrows.pptx
+++ b/activity/arrows.pptx
@@ -6,7 +6,9 @@
   </p:sldMasterIdLst>
   <p:sldIdLst>
     <p:sldId id="256" r:id="rId2"/>
-    <p:sldId id="257" r:id="rId3"/>
+    <p:sldId id="258" r:id="rId3"/>
+    <p:sldId id="257" r:id="rId4"/>
+    <p:sldId id="259" r:id="rId5"/>
   </p:sldIdLst>
   <p:sldSz cx="12192000" cy="6858000"/>
   <p:notesSz cx="6858000" cy="9144000"/>
@@ -105,6 +107,11 @@
       </a:defRPr>
     </a:lvl9pPr>
   </p:defaultTextStyle>
+  <p:extLst>
+    <p:ext uri="{EFAFB233-063F-42B5-8137-9DF3F51BA10A}">
+      <p15:sldGuideLst xmlns:p15="http://schemas.microsoft.com/office/powerpoint/2012/main"/>
+    </p:ext>
+  </p:extLst>
 </p:presentation>
 </file>
 
@@ -255,7 +262,7 @@
           <a:p>
             <a:fld id="{30E587A3-74E4-8F4B-80CD-916A61BFF60E}" type="datetimeFigureOut">
               <a:rPr lang="en-US" smtClean="0"/>
-              <a:t>10/10/23</a:t>
+              <a:t>10/11/23</a:t>
             </a:fld>
             <a:endParaRPr lang="en-US"/>
           </a:p>
@@ -453,7 +460,7 @@
           <a:p>
             <a:fld id="{30E587A3-74E4-8F4B-80CD-916A61BFF60E}" type="datetimeFigureOut">
               <a:rPr lang="en-US" smtClean="0"/>
-              <a:t>10/10/23</a:t>
+              <a:t>10/11/23</a:t>
             </a:fld>
             <a:endParaRPr lang="en-US"/>
           </a:p>
@@ -661,7 +668,7 @@
           <a:p>
             <a:fld id="{30E587A3-74E4-8F4B-80CD-916A61BFF60E}" type="datetimeFigureOut">
               <a:rPr lang="en-US" smtClean="0"/>
-              <a:t>10/10/23</a:t>
+              <a:t>10/11/23</a:t>
             </a:fld>
             <a:endParaRPr lang="en-US"/>
           </a:p>
@@ -859,7 +866,7 @@
           <a:p>
             <a:fld id="{30E587A3-74E4-8F4B-80CD-916A61BFF60E}" type="datetimeFigureOut">
               <a:rPr lang="en-US" smtClean="0"/>
-              <a:t>10/10/23</a:t>
+              <a:t>10/11/23</a:t>
             </a:fld>
             <a:endParaRPr lang="en-US"/>
           </a:p>
@@ -1134,7 +1141,7 @@
           <a:p>
             <a:fld id="{30E587A3-74E4-8F4B-80CD-916A61BFF60E}" type="datetimeFigureOut">
               <a:rPr lang="en-US" smtClean="0"/>
-              <a:t>10/10/23</a:t>
+              <a:t>10/11/23</a:t>
             </a:fld>
             <a:endParaRPr lang="en-US"/>
           </a:p>
@@ -1399,7 +1406,7 @@
           <a:p>
             <a:fld id="{30E587A3-74E4-8F4B-80CD-916A61BFF60E}" type="datetimeFigureOut">
               <a:rPr lang="en-US" smtClean="0"/>
-              <a:t>10/10/23</a:t>
+              <a:t>10/11/23</a:t>
             </a:fld>
             <a:endParaRPr lang="en-US"/>
           </a:p>
@@ -1811,7 +1818,7 @@
           <a:p>
             <a:fld id="{30E587A3-74E4-8F4B-80CD-916A61BFF60E}" type="datetimeFigureOut">
               <a:rPr lang="en-US" smtClean="0"/>
-              <a:t>10/10/23</a:t>
+              <a:t>10/11/23</a:t>
             </a:fld>
             <a:endParaRPr lang="en-US"/>
           </a:p>
@@ -1952,7 +1959,7 @@
           <a:p>
             <a:fld id="{30E587A3-74E4-8F4B-80CD-916A61BFF60E}" type="datetimeFigureOut">
               <a:rPr lang="en-US" smtClean="0"/>
-              <a:t>10/10/23</a:t>
+              <a:t>10/11/23</a:t>
             </a:fld>
             <a:endParaRPr lang="en-US"/>
           </a:p>
@@ -2065,7 +2072,7 @@
           <a:p>
             <a:fld id="{30E587A3-74E4-8F4B-80CD-916A61BFF60E}" type="datetimeFigureOut">
               <a:rPr lang="en-US" smtClean="0"/>
-              <a:t>10/10/23</a:t>
+              <a:t>10/11/23</a:t>
             </a:fld>
             <a:endParaRPr lang="en-US"/>
           </a:p>
@@ -2376,7 +2383,7 @@
           <a:p>
             <a:fld id="{30E587A3-74E4-8F4B-80CD-916A61BFF60E}" type="datetimeFigureOut">
               <a:rPr lang="en-US" smtClean="0"/>
-              <a:t>10/10/23</a:t>
+              <a:t>10/11/23</a:t>
             </a:fld>
             <a:endParaRPr lang="en-US"/>
           </a:p>
@@ -2664,7 +2671,7 @@
           <a:p>
             <a:fld id="{30E587A3-74E4-8F4B-80CD-916A61BFF60E}" type="datetimeFigureOut">
               <a:rPr lang="en-US" smtClean="0"/>
-              <a:t>10/10/23</a:t>
+              <a:t>10/11/23</a:t>
             </a:fld>
             <a:endParaRPr lang="en-US"/>
           </a:p>
@@ -2905,7 +2912,7 @@
           <a:p>
             <a:fld id="{30E587A3-74E4-8F4B-80CD-916A61BFF60E}" type="datetimeFigureOut">
               <a:rPr lang="en-US" smtClean="0"/>
-              <a:t>10/10/23</a:t>
+              <a:t>10/11/23</a:t>
             </a:fld>
             <a:endParaRPr lang="en-US"/>
           </a:p>
@@ -3614,7 +3621,7 @@
                   <a:schemeClr val="tx1"/>
                 </a:solidFill>
               </a:rPr>
-              <a:t>count(data= sqf_2011, race) </a:t>
+              <a:t>count(x= sqf_2011, race) </a:t>
             </a:r>
           </a:p>
         </p:txBody>
@@ -3654,6 +3661,353 @@
           <p:cNvPr id="4" name="Right Arrow 3">
             <a:extLst>
               <a:ext uri="{FF2B5EF4-FFF2-40B4-BE49-F238E27FC236}">
+                <a16:creationId xmlns:a16="http://schemas.microsoft.com/office/drawing/2014/main" id="{B11953DD-00D9-B929-4C49-625A88247A23}"/>
+              </a:ext>
+            </a:extLst>
+          </p:cNvPr>
+          <p:cNvSpPr/>
+          <p:nvPr/>
+        </p:nvSpPr>
+        <p:spPr>
+          <a:xfrm>
+            <a:off x="168812" y="112542"/>
+            <a:ext cx="4044251" cy="2914875"/>
+          </a:xfrm>
+          <a:prstGeom prst="rightArrow">
+            <a:avLst/>
+          </a:prstGeom>
+          <a:solidFill>
+            <a:schemeClr val="bg1">
+              <a:lumMod val="75000"/>
+            </a:schemeClr>
+          </a:solidFill>
+        </p:spPr>
+        <p:style>
+          <a:lnRef idx="2">
+            <a:schemeClr val="accent1">
+              <a:shade val="50000"/>
+            </a:schemeClr>
+          </a:lnRef>
+          <a:fillRef idx="1">
+            <a:schemeClr val="accent1"/>
+          </a:fillRef>
+          <a:effectRef idx="0">
+            <a:schemeClr val="accent1"/>
+          </a:effectRef>
+          <a:fontRef idx="minor">
+            <a:schemeClr val="lt1"/>
+          </a:fontRef>
+        </p:style>
+        <p:txBody>
+          <a:bodyPr rtlCol="0" anchor="ctr"/>
+          <a:lstStyle/>
+          <a:p>
+            <a:r>
+              <a:rPr lang="en-US" dirty="0">
+                <a:solidFill>
+                  <a:schemeClr val="tx1"/>
+                </a:solidFill>
+              </a:rPr>
+              <a:t>select(</a:t>
+            </a:r>
+          </a:p>
+          <a:p>
+            <a:r>
+              <a:rPr lang="en-US" dirty="0">
+                <a:solidFill>
+                  <a:schemeClr val="tx1"/>
+                </a:solidFill>
+              </a:rPr>
+              <a:t>data = sqf_2021, </a:t>
+            </a:r>
+          </a:p>
+          <a:p>
+            <a:r>
+              <a:rPr lang="en-US" dirty="0">
+                <a:solidFill>
+                  <a:schemeClr val="tx1"/>
+                </a:solidFill>
+              </a:rPr>
+              <a:t>SUSPECT_SEX, SUSPECT_RACE_DESCRIPTION, SUSPECT_REPORTED_AGE)</a:t>
+            </a:r>
+          </a:p>
+        </p:txBody>
+      </p:sp>
+      <p:sp>
+        <p:nvSpPr>
+          <p:cNvPr id="5" name="Right Arrow 4">
+            <a:extLst>
+              <a:ext uri="{FF2B5EF4-FFF2-40B4-BE49-F238E27FC236}">
+                <a16:creationId xmlns:a16="http://schemas.microsoft.com/office/drawing/2014/main" id="{C1A89E16-15A7-CCF1-0521-2405C979CC6D}"/>
+              </a:ext>
+            </a:extLst>
+          </p:cNvPr>
+          <p:cNvSpPr/>
+          <p:nvPr/>
+        </p:nvSpPr>
+        <p:spPr>
+          <a:xfrm>
+            <a:off x="4545545" y="112542"/>
+            <a:ext cx="7355723" cy="6625883"/>
+          </a:xfrm>
+          <a:prstGeom prst="rightArrow">
+            <a:avLst/>
+          </a:prstGeom>
+          <a:solidFill>
+            <a:schemeClr val="bg1">
+              <a:lumMod val="75000"/>
+            </a:schemeClr>
+          </a:solidFill>
+        </p:spPr>
+        <p:style>
+          <a:lnRef idx="2">
+            <a:schemeClr val="accent1">
+              <a:shade val="50000"/>
+            </a:schemeClr>
+          </a:lnRef>
+          <a:fillRef idx="1">
+            <a:schemeClr val="accent1"/>
+          </a:fillRef>
+          <a:effectRef idx="0">
+            <a:schemeClr val="accent1"/>
+          </a:effectRef>
+          <a:fontRef idx="minor">
+            <a:schemeClr val="lt1"/>
+          </a:fontRef>
+        </p:style>
+        <p:txBody>
+          <a:bodyPr rtlCol="0" anchor="ctr"/>
+          <a:lstStyle/>
+          <a:p>
+            <a:r>
+              <a:rPr lang="en-US" dirty="0">
+                <a:solidFill>
+                  <a:schemeClr val="tx1"/>
+                </a:solidFill>
+              </a:rPr>
+              <a:t>recode(</a:t>
+            </a:r>
+          </a:p>
+          <a:p>
+            <a:r>
+              <a:rPr lang="en-US" dirty="0">
+                <a:solidFill>
+                  <a:schemeClr val="tx1"/>
+                </a:solidFill>
+              </a:rPr>
+              <a:t>    sqf_2021$race,</a:t>
+            </a:r>
+          </a:p>
+          <a:p>
+            <a:r>
+              <a:rPr lang="en-US" dirty="0">
+                <a:solidFill>
+                  <a:schemeClr val="tx1"/>
+                </a:solidFill>
+              </a:rPr>
+              <a:t>    "BLACK HISPANIC" = "Hispanic",</a:t>
+            </a:r>
+          </a:p>
+          <a:p>
+            <a:r>
+              <a:rPr lang="en-US" dirty="0">
+                <a:solidFill>
+                  <a:schemeClr val="tx1"/>
+                </a:solidFill>
+              </a:rPr>
+              <a:t>    "WHITE HISPANIC"= "Hispanic",</a:t>
+            </a:r>
+          </a:p>
+          <a:p>
+            <a:r>
+              <a:rPr lang="en-US" dirty="0">
+                <a:solidFill>
+                  <a:schemeClr val="tx1"/>
+                </a:solidFill>
+              </a:rPr>
+              <a:t>    "BLACK"= "Black",</a:t>
+            </a:r>
+          </a:p>
+          <a:p>
+            <a:r>
+              <a:rPr lang="en-US" dirty="0">
+                <a:solidFill>
+                  <a:schemeClr val="tx1"/>
+                </a:solidFill>
+              </a:rPr>
+              <a:t>    "WHITE"= "White",</a:t>
+            </a:r>
+          </a:p>
+          <a:p>
+            <a:r>
+              <a:rPr lang="en-US" dirty="0">
+                <a:solidFill>
+                  <a:schemeClr val="tx1"/>
+                </a:solidFill>
+              </a:rPr>
+              <a:t>    "MIDDLE EASTERN/SOUTHWEST ASIAN"= "MESA",</a:t>
+            </a:r>
+          </a:p>
+          <a:p>
+            <a:r>
+              <a:rPr lang="en-US" dirty="0">
+                <a:solidFill>
+                  <a:schemeClr val="tx1"/>
+                </a:solidFill>
+              </a:rPr>
+              <a:t>    "ASIAN / PACIFIC ISLANDER"= "API",</a:t>
+            </a:r>
+          </a:p>
+          <a:p>
+            <a:r>
+              <a:rPr lang="en-US" dirty="0">
+                <a:solidFill>
+                  <a:schemeClr val="tx1"/>
+                </a:solidFill>
+              </a:rPr>
+              <a:t>    "AMERICAN INDIAN/ALASKAN NATIVE"= "AMAN",</a:t>
+            </a:r>
+          </a:p>
+          <a:p>
+            <a:r>
+              <a:rPr lang="en-US" dirty="0">
+                <a:solidFill>
+                  <a:schemeClr val="tx1"/>
+                </a:solidFill>
+              </a:rPr>
+              <a:t>    "no data"= "no data",</a:t>
+            </a:r>
+          </a:p>
+          <a:p>
+            <a:r>
+              <a:rPr lang="en-US" dirty="0">
+                <a:solidFill>
+                  <a:schemeClr val="tx1"/>
+                </a:solidFill>
+              </a:rPr>
+              <a:t>    .default = </a:t>
+            </a:r>
+            <a:r>
+              <a:rPr lang="en-US" dirty="0" err="1">
+                <a:solidFill>
+                  <a:schemeClr val="tx1"/>
+                </a:solidFill>
+              </a:rPr>
+              <a:t>NA_character</a:t>
+            </a:r>
+            <a:r>
+              <a:rPr lang="en-US" dirty="0">
+                <a:solidFill>
+                  <a:schemeClr val="tx1"/>
+                </a:solidFill>
+              </a:rPr>
+              <a:t>_</a:t>
+            </a:r>
+          </a:p>
+          <a:p>
+            <a:r>
+              <a:rPr lang="en-US" dirty="0">
+                <a:solidFill>
+                  <a:schemeClr val="tx1"/>
+                </a:solidFill>
+              </a:rPr>
+              <a:t>  )</a:t>
+            </a:r>
+          </a:p>
+        </p:txBody>
+      </p:sp>
+      <p:sp>
+        <p:nvSpPr>
+          <p:cNvPr id="6" name="Right Arrow 5">
+            <a:extLst>
+              <a:ext uri="{FF2B5EF4-FFF2-40B4-BE49-F238E27FC236}">
+                <a16:creationId xmlns:a16="http://schemas.microsoft.com/office/drawing/2014/main" id="{579CCD8A-EB15-940E-4E06-5F284D8C1E22}"/>
+              </a:ext>
+            </a:extLst>
+          </p:cNvPr>
+          <p:cNvSpPr/>
+          <p:nvPr/>
+        </p:nvSpPr>
+        <p:spPr>
+          <a:xfrm>
+            <a:off x="168813" y="3248760"/>
+            <a:ext cx="4044250" cy="2914875"/>
+          </a:xfrm>
+          <a:prstGeom prst="rightArrow">
+            <a:avLst/>
+          </a:prstGeom>
+          <a:solidFill>
+            <a:schemeClr val="bg1">
+              <a:lumMod val="75000"/>
+            </a:schemeClr>
+          </a:solidFill>
+        </p:spPr>
+        <p:style>
+          <a:lnRef idx="2">
+            <a:schemeClr val="accent1">
+              <a:shade val="50000"/>
+            </a:schemeClr>
+          </a:lnRef>
+          <a:fillRef idx="1">
+            <a:schemeClr val="accent1"/>
+          </a:fillRef>
+          <a:effectRef idx="0">
+            <a:schemeClr val="accent1"/>
+          </a:effectRef>
+          <a:fontRef idx="minor">
+            <a:schemeClr val="lt1"/>
+          </a:fontRef>
+        </p:style>
+        <p:txBody>
+          <a:bodyPr rtlCol="0" anchor="ctr"/>
+          <a:lstStyle/>
+          <a:p>
+            <a:r>
+              <a:rPr lang="en-US" dirty="0">
+                <a:solidFill>
+                  <a:schemeClr val="tx1"/>
+                </a:solidFill>
+              </a:rPr>
+              <a:t>count(x= sqf_2021, race) </a:t>
+            </a:r>
+          </a:p>
+        </p:txBody>
+      </p:sp>
+    </p:spTree>
+    <p:extLst>
+      <p:ext uri="{BB962C8B-B14F-4D97-AF65-F5344CB8AC3E}">
+        <p14:creationId xmlns:p14="http://schemas.microsoft.com/office/powerpoint/2010/main" val="292535490"/>
+      </p:ext>
+    </p:extLst>
+  </p:cSld>
+  <p:clrMapOvr>
+    <a:masterClrMapping/>
+  </p:clrMapOvr>
+</p:sld>
+</file>
+
+<file path=ppt/slides/slide3.xml><?xml version="1.0" encoding="utf-8"?>
+<p:sld xmlns:a="http://schemas.openxmlformats.org/drawingml/2006/main" xmlns:r="http://schemas.openxmlformats.org/officeDocument/2006/relationships" xmlns:p="http://schemas.openxmlformats.org/presentationml/2006/main">
+  <p:cSld>
+    <p:spTree>
+      <p:nvGrpSpPr>
+        <p:cNvPr id="1" name=""/>
+        <p:cNvGrpSpPr/>
+        <p:nvPr/>
+      </p:nvGrpSpPr>
+      <p:grpSpPr>
+        <a:xfrm>
+          <a:off x="0" y="0"/>
+          <a:ext cx="0" cy="0"/>
+          <a:chOff x="0" y="0"/>
+          <a:chExt cx="0" cy="0"/>
+        </a:xfrm>
+      </p:grpSpPr>
+      <p:sp>
+        <p:nvSpPr>
+          <p:cNvPr id="4" name="Right Arrow 3">
+            <a:extLst>
+              <a:ext uri="{FF2B5EF4-FFF2-40B4-BE49-F238E27FC236}">
                 <a16:creationId xmlns:a16="http://schemas.microsoft.com/office/drawing/2014/main" id="{8C88B12D-2EF6-E916-EA08-686BF9510A8B}"/>
               </a:ext>
             </a:extLst>
@@ -3844,6 +4198,300 @@
     <p:extLst>
       <p:ext uri="{BB962C8B-B14F-4D97-AF65-F5344CB8AC3E}">
         <p14:creationId xmlns:p14="http://schemas.microsoft.com/office/powerpoint/2010/main" val="2552461666"/>
+      </p:ext>
+    </p:extLst>
+  </p:cSld>
+  <p:clrMapOvr>
+    <a:masterClrMapping/>
+  </p:clrMapOvr>
+</p:sld>
+</file>
+
+<file path=ppt/slides/slide4.xml><?xml version="1.0" encoding="utf-8"?>
+<p:sld xmlns:a="http://schemas.openxmlformats.org/drawingml/2006/main" xmlns:r="http://schemas.openxmlformats.org/officeDocument/2006/relationships" xmlns:p="http://schemas.openxmlformats.org/presentationml/2006/main">
+  <p:cSld>
+    <p:spTree>
+      <p:nvGrpSpPr>
+        <p:cNvPr id="1" name=""/>
+        <p:cNvGrpSpPr/>
+        <p:nvPr/>
+      </p:nvGrpSpPr>
+      <p:grpSpPr>
+        <a:xfrm>
+          <a:off x="0" y="0"/>
+          <a:ext cx="0" cy="0"/>
+          <a:chOff x="0" y="0"/>
+          <a:chExt cx="0" cy="0"/>
+        </a:xfrm>
+      </p:grpSpPr>
+      <p:sp>
+        <p:nvSpPr>
+          <p:cNvPr id="4" name="Right Arrow 3">
+            <a:extLst>
+              <a:ext uri="{FF2B5EF4-FFF2-40B4-BE49-F238E27FC236}">
+                <a16:creationId xmlns:a16="http://schemas.microsoft.com/office/drawing/2014/main" id="{8C88B12D-2EF6-E916-EA08-686BF9510A8B}"/>
+              </a:ext>
+            </a:extLst>
+          </p:cNvPr>
+          <p:cNvSpPr/>
+          <p:nvPr/>
+        </p:nvSpPr>
+        <p:spPr>
+          <a:xfrm>
+            <a:off x="571210" y="224590"/>
+            <a:ext cx="3519527" cy="2736660"/>
+          </a:xfrm>
+          <a:prstGeom prst="rightArrow">
+            <a:avLst/>
+          </a:prstGeom>
+          <a:solidFill>
+            <a:schemeClr val="bg1">
+              <a:lumMod val="75000"/>
+            </a:schemeClr>
+          </a:solidFill>
+        </p:spPr>
+        <p:style>
+          <a:lnRef idx="2">
+            <a:schemeClr val="accent1">
+              <a:shade val="50000"/>
+            </a:schemeClr>
+          </a:lnRef>
+          <a:fillRef idx="1">
+            <a:schemeClr val="accent1"/>
+          </a:fillRef>
+          <a:effectRef idx="0">
+            <a:schemeClr val="accent1"/>
+          </a:effectRef>
+          <a:fontRef idx="minor">
+            <a:schemeClr val="lt1"/>
+          </a:fontRef>
+        </p:style>
+        <p:txBody>
+          <a:bodyPr rtlCol="0" anchor="ctr"/>
+          <a:lstStyle/>
+          <a:p>
+            <a:r>
+              <a:rPr lang="en-US" dirty="0">
+                <a:solidFill>
+                  <a:schemeClr val="tx1"/>
+                </a:solidFill>
+              </a:rPr>
+              <a:t>rename(</a:t>
+            </a:r>
+          </a:p>
+          <a:p>
+            <a:r>
+              <a:rPr lang="en-US" dirty="0">
+                <a:solidFill>
+                  <a:schemeClr val="tx1"/>
+                </a:solidFill>
+              </a:rPr>
+              <a:t>data= sqf_2021, total = n )</a:t>
+            </a:r>
+          </a:p>
+        </p:txBody>
+      </p:sp>
+      <p:sp>
+        <p:nvSpPr>
+          <p:cNvPr id="9" name="Right Arrow 8">
+            <a:extLst>
+              <a:ext uri="{FF2B5EF4-FFF2-40B4-BE49-F238E27FC236}">
+                <a16:creationId xmlns:a16="http://schemas.microsoft.com/office/drawing/2014/main" id="{3E9EF86B-D410-AF10-5B00-7D7CA6171BFC}"/>
+              </a:ext>
+            </a:extLst>
+          </p:cNvPr>
+          <p:cNvSpPr/>
+          <p:nvPr/>
+        </p:nvSpPr>
+        <p:spPr>
+          <a:xfrm>
+            <a:off x="571209" y="3240817"/>
+            <a:ext cx="3744117" cy="3161379"/>
+          </a:xfrm>
+          <a:prstGeom prst="rightArrow">
+            <a:avLst/>
+          </a:prstGeom>
+          <a:solidFill>
+            <a:schemeClr val="bg1">
+              <a:lumMod val="75000"/>
+            </a:schemeClr>
+          </a:solidFill>
+        </p:spPr>
+        <p:style>
+          <a:lnRef idx="2">
+            <a:schemeClr val="accent1">
+              <a:shade val="50000"/>
+            </a:schemeClr>
+          </a:lnRef>
+          <a:fillRef idx="1">
+            <a:schemeClr val="accent1"/>
+          </a:fillRef>
+          <a:effectRef idx="0">
+            <a:schemeClr val="accent1"/>
+          </a:effectRef>
+          <a:fontRef idx="minor">
+            <a:schemeClr val="lt1"/>
+          </a:fontRef>
+        </p:style>
+        <p:txBody>
+          <a:bodyPr rtlCol="0" anchor="ctr"/>
+          <a:lstStyle/>
+          <a:p>
+            <a:r>
+              <a:rPr lang="en-US" dirty="0">
+                <a:solidFill>
+                  <a:schemeClr val="tx1"/>
+                </a:solidFill>
+              </a:rPr>
+              <a:t>mutate(</a:t>
+            </a:r>
+          </a:p>
+          <a:p>
+            <a:r>
+              <a:rPr lang="en-US" dirty="0">
+                <a:solidFill>
+                  <a:schemeClr val="tx1"/>
+                </a:solidFill>
+              </a:rPr>
+              <a:t>data = sqf_2021, percentage = total/sum(total) * 100 ) </a:t>
+            </a:r>
+          </a:p>
+        </p:txBody>
+      </p:sp>
+      <p:sp>
+        <p:nvSpPr>
+          <p:cNvPr id="12" name="Right Arrow 11">
+            <a:extLst>
+              <a:ext uri="{FF2B5EF4-FFF2-40B4-BE49-F238E27FC236}">
+                <a16:creationId xmlns:a16="http://schemas.microsoft.com/office/drawing/2014/main" id="{8B0B862E-F573-18DA-2578-5A4E38F6DE69}"/>
+              </a:ext>
+            </a:extLst>
+          </p:cNvPr>
+          <p:cNvSpPr/>
+          <p:nvPr/>
+        </p:nvSpPr>
+        <p:spPr>
+          <a:xfrm>
+            <a:off x="6341501" y="224590"/>
+            <a:ext cx="3519527" cy="2736660"/>
+          </a:xfrm>
+          <a:prstGeom prst="rightArrow">
+            <a:avLst/>
+          </a:prstGeom>
+          <a:solidFill>
+            <a:schemeClr val="bg1">
+              <a:lumMod val="75000"/>
+            </a:schemeClr>
+          </a:solidFill>
+        </p:spPr>
+        <p:style>
+          <a:lnRef idx="2">
+            <a:schemeClr val="accent1">
+              <a:shade val="50000"/>
+            </a:schemeClr>
+          </a:lnRef>
+          <a:fillRef idx="1">
+            <a:schemeClr val="accent1"/>
+          </a:fillRef>
+          <a:effectRef idx="0">
+            <a:schemeClr val="accent1"/>
+          </a:effectRef>
+          <a:fontRef idx="minor">
+            <a:schemeClr val="lt1"/>
+          </a:fontRef>
+        </p:style>
+        <p:txBody>
+          <a:bodyPr rtlCol="0" anchor="ctr"/>
+          <a:lstStyle/>
+          <a:p>
+            <a:r>
+              <a:rPr lang="en-US" dirty="0">
+                <a:solidFill>
+                  <a:schemeClr val="tx1"/>
+                </a:solidFill>
+              </a:rPr>
+              <a:t>arrange(data =sqf_2021 desc(percentage))</a:t>
+            </a:r>
+          </a:p>
+        </p:txBody>
+      </p:sp>
+      <p:sp>
+        <p:nvSpPr>
+          <p:cNvPr id="2" name="Right Arrow 1">
+            <a:extLst>
+              <a:ext uri="{FF2B5EF4-FFF2-40B4-BE49-F238E27FC236}">
+                <a16:creationId xmlns:a16="http://schemas.microsoft.com/office/drawing/2014/main" id="{983EF8F8-04A8-7491-672E-0252D03E7A31}"/>
+              </a:ext>
+            </a:extLst>
+          </p:cNvPr>
+          <p:cNvSpPr/>
+          <p:nvPr/>
+        </p:nvSpPr>
+        <p:spPr>
+          <a:xfrm>
+            <a:off x="6079138" y="3487321"/>
+            <a:ext cx="4044251" cy="2914875"/>
+          </a:xfrm>
+          <a:prstGeom prst="rightArrow">
+            <a:avLst/>
+          </a:prstGeom>
+          <a:solidFill>
+            <a:schemeClr val="bg1">
+              <a:lumMod val="75000"/>
+            </a:schemeClr>
+          </a:solidFill>
+        </p:spPr>
+        <p:style>
+          <a:lnRef idx="2">
+            <a:schemeClr val="accent1">
+              <a:shade val="50000"/>
+            </a:schemeClr>
+          </a:lnRef>
+          <a:fillRef idx="1">
+            <a:schemeClr val="accent1"/>
+          </a:fillRef>
+          <a:effectRef idx="0">
+            <a:schemeClr val="accent1"/>
+          </a:effectRef>
+          <a:fontRef idx="minor">
+            <a:schemeClr val="lt1"/>
+          </a:fontRef>
+        </p:style>
+        <p:txBody>
+          <a:bodyPr rtlCol="0" anchor="ctr"/>
+          <a:lstStyle/>
+          <a:p>
+            <a:r>
+              <a:rPr lang="en-US" dirty="0">
+                <a:solidFill>
+                  <a:schemeClr val="tx1"/>
+                </a:solidFill>
+              </a:rPr>
+              <a:t>names(sqf_2021) &lt;- c("</a:t>
+            </a:r>
+            <a:r>
+              <a:rPr lang="en-US" dirty="0" err="1">
+                <a:solidFill>
+                  <a:schemeClr val="tx1"/>
+                </a:solidFill>
+              </a:rPr>
+              <a:t>sex","race","age</a:t>
+            </a:r>
+            <a:r>
+              <a:rPr lang="en-US" dirty="0">
+                <a:solidFill>
+                  <a:schemeClr val="tx1"/>
+                </a:solidFill>
+              </a:rPr>
+              <a:t>") </a:t>
+            </a:r>
+          </a:p>
+        </p:txBody>
+      </p:sp>
+    </p:spTree>
+    <p:extLst>
+      <p:ext uri="{BB962C8B-B14F-4D97-AF65-F5344CB8AC3E}">
+        <p14:creationId xmlns:p14="http://schemas.microsoft.com/office/powerpoint/2010/main" val="3295169921"/>
       </p:ext>
     </p:extLst>
   </p:cSld>

</xml_diff>

<commit_message>
digestion, arrows and presentation updates
</commit_message>
<xml_diff>
--- a/activity/arrows.pptx
+++ b/activity/arrows.pptx
@@ -9,6 +9,7 @@
     <p:sldId id="258" r:id="rId3"/>
     <p:sldId id="257" r:id="rId4"/>
     <p:sldId id="259" r:id="rId5"/>
+    <p:sldId id="260" r:id="rId6"/>
   </p:sldIdLst>
   <p:sldSz cx="12192000" cy="6858000"/>
   <p:notesSz cx="6858000" cy="9144000"/>
@@ -262,7 +263,7 @@
           <a:p>
             <a:fld id="{30E587A3-74E4-8F4B-80CD-916A61BFF60E}" type="datetimeFigureOut">
               <a:rPr lang="en-US" smtClean="0"/>
-              <a:t>10/11/23</a:t>
+              <a:t>10/17/23</a:t>
             </a:fld>
             <a:endParaRPr lang="en-US"/>
           </a:p>
@@ -460,7 +461,7 @@
           <a:p>
             <a:fld id="{30E587A3-74E4-8F4B-80CD-916A61BFF60E}" type="datetimeFigureOut">
               <a:rPr lang="en-US" smtClean="0"/>
-              <a:t>10/11/23</a:t>
+              <a:t>10/17/23</a:t>
             </a:fld>
             <a:endParaRPr lang="en-US"/>
           </a:p>
@@ -668,7 +669,7 @@
           <a:p>
             <a:fld id="{30E587A3-74E4-8F4B-80CD-916A61BFF60E}" type="datetimeFigureOut">
               <a:rPr lang="en-US" smtClean="0"/>
-              <a:t>10/11/23</a:t>
+              <a:t>10/17/23</a:t>
             </a:fld>
             <a:endParaRPr lang="en-US"/>
           </a:p>
@@ -866,7 +867,7 @@
           <a:p>
             <a:fld id="{30E587A3-74E4-8F4B-80CD-916A61BFF60E}" type="datetimeFigureOut">
               <a:rPr lang="en-US" smtClean="0"/>
-              <a:t>10/11/23</a:t>
+              <a:t>10/17/23</a:t>
             </a:fld>
             <a:endParaRPr lang="en-US"/>
           </a:p>
@@ -1141,7 +1142,7 @@
           <a:p>
             <a:fld id="{30E587A3-74E4-8F4B-80CD-916A61BFF60E}" type="datetimeFigureOut">
               <a:rPr lang="en-US" smtClean="0"/>
-              <a:t>10/11/23</a:t>
+              <a:t>10/17/23</a:t>
             </a:fld>
             <a:endParaRPr lang="en-US"/>
           </a:p>
@@ -1406,7 +1407,7 @@
           <a:p>
             <a:fld id="{30E587A3-74E4-8F4B-80CD-916A61BFF60E}" type="datetimeFigureOut">
               <a:rPr lang="en-US" smtClean="0"/>
-              <a:t>10/11/23</a:t>
+              <a:t>10/17/23</a:t>
             </a:fld>
             <a:endParaRPr lang="en-US"/>
           </a:p>
@@ -1818,7 +1819,7 @@
           <a:p>
             <a:fld id="{30E587A3-74E4-8F4B-80CD-916A61BFF60E}" type="datetimeFigureOut">
               <a:rPr lang="en-US" smtClean="0"/>
-              <a:t>10/11/23</a:t>
+              <a:t>10/17/23</a:t>
             </a:fld>
             <a:endParaRPr lang="en-US"/>
           </a:p>
@@ -1959,7 +1960,7 @@
           <a:p>
             <a:fld id="{30E587A3-74E4-8F4B-80CD-916A61BFF60E}" type="datetimeFigureOut">
               <a:rPr lang="en-US" smtClean="0"/>
-              <a:t>10/11/23</a:t>
+              <a:t>10/17/23</a:t>
             </a:fld>
             <a:endParaRPr lang="en-US"/>
           </a:p>
@@ -2072,7 +2073,7 @@
           <a:p>
             <a:fld id="{30E587A3-74E4-8F4B-80CD-916A61BFF60E}" type="datetimeFigureOut">
               <a:rPr lang="en-US" smtClean="0"/>
-              <a:t>10/11/23</a:t>
+              <a:t>10/17/23</a:t>
             </a:fld>
             <a:endParaRPr lang="en-US"/>
           </a:p>
@@ -2383,7 +2384,7 @@
           <a:p>
             <a:fld id="{30E587A3-74E4-8F4B-80CD-916A61BFF60E}" type="datetimeFigureOut">
               <a:rPr lang="en-US" smtClean="0"/>
-              <a:t>10/11/23</a:t>
+              <a:t>10/17/23</a:t>
             </a:fld>
             <a:endParaRPr lang="en-US"/>
           </a:p>
@@ -2671,7 +2672,7 @@
           <a:p>
             <a:fld id="{30E587A3-74E4-8F4B-80CD-916A61BFF60E}" type="datetimeFigureOut">
               <a:rPr lang="en-US" smtClean="0"/>
-              <a:t>10/11/23</a:t>
+              <a:t>10/17/23</a:t>
             </a:fld>
             <a:endParaRPr lang="en-US"/>
           </a:p>
@@ -2912,7 +2913,7 @@
           <a:p>
             <a:fld id="{30E587A3-74E4-8F4B-80CD-916A61BFF60E}" type="datetimeFigureOut">
               <a:rPr lang="en-US" smtClean="0"/>
-              <a:t>10/11/23</a:t>
+              <a:t>10/17/23</a:t>
             </a:fld>
             <a:endParaRPr lang="en-US"/>
           </a:p>
@@ -3381,27 +3382,7 @@
                   <a:schemeClr val="tx1"/>
                 </a:solidFill>
               </a:rPr>
-              <a:t>select(</a:t>
-            </a:r>
-          </a:p>
-          <a:p>
-            <a:r>
-              <a:rPr lang="en-US" dirty="0">
-                <a:solidFill>
-                  <a:schemeClr val="tx1"/>
-                </a:solidFill>
-              </a:rPr>
-              <a:t>data = sqf_2011, </a:t>
-            </a:r>
-          </a:p>
-          <a:p>
-            <a:r>
-              <a:rPr lang="en-US" dirty="0">
-                <a:solidFill>
-                  <a:schemeClr val="tx1"/>
-                </a:solidFill>
-              </a:rPr>
-              <a:t>sex, race, age )</a:t>
+              <a:t>sqf_2011</a:t>
             </a:r>
           </a:p>
         </p:txBody>
@@ -3420,8 +3401,8 @@
         </p:nvSpPr>
         <p:spPr>
           <a:xfrm>
-            <a:off x="4545545" y="112542"/>
-            <a:ext cx="7355723" cy="6625883"/>
+            <a:off x="4336473" y="112542"/>
+            <a:ext cx="7564795" cy="6625883"/>
           </a:xfrm>
           <a:prstGeom prst="rightArrow">
             <a:avLst/>
@@ -3453,17 +3434,37 @@
           <a:lstStyle/>
           <a:p>
             <a:r>
-              <a:rPr lang="en-US" dirty="0">
-                <a:solidFill>
-                  <a:schemeClr val="tx1"/>
-                </a:solidFill>
-              </a:rPr>
-              <a:t>recode(   sqf_2011$race, </a:t>
-            </a:r>
-          </a:p>
-          <a:p>
-            <a:r>
-              <a:rPr lang="en-US" dirty="0">
+              <a:rPr lang="en-US" sz="1600" dirty="0">
+                <a:solidFill>
+                  <a:schemeClr val="tx1"/>
+                </a:solidFill>
+              </a:rPr>
+              <a:t>sqf_2011$race&lt;-</a:t>
+            </a:r>
+          </a:p>
+          <a:p>
+            <a:r>
+              <a:rPr lang="en-US" sz="1600" dirty="0">
+                <a:solidFill>
+                  <a:schemeClr val="tx1"/>
+                </a:solidFill>
+              </a:rPr>
+              <a:t>  recode(</a:t>
+            </a:r>
+          </a:p>
+          <a:p>
+            <a:r>
+              <a:rPr lang="en-US" sz="1600" dirty="0">
+                <a:solidFill>
+                  <a:schemeClr val="tx1"/>
+                </a:solidFill>
+              </a:rPr>
+              <a:t>    sqf_2011$race, </a:t>
+            </a:r>
+          </a:p>
+          <a:p>
+            <a:r>
+              <a:rPr lang="en-US" sz="1600" dirty="0">
                 <a:solidFill>
                   <a:schemeClr val="tx1"/>
                 </a:solidFill>
@@ -3473,7 +3474,7 @@
           </a:p>
           <a:p>
             <a:r>
-              <a:rPr lang="en-US" dirty="0">
+              <a:rPr lang="en-US" sz="1600" dirty="0">
                 <a:solidFill>
                   <a:schemeClr val="tx1"/>
                 </a:solidFill>
@@ -3483,17 +3484,17 @@
           </a:p>
           <a:p>
             <a:r>
-              <a:rPr lang="en-US" dirty="0">
-                <a:solidFill>
-                  <a:schemeClr val="tx1"/>
-                </a:solidFill>
-              </a:rPr>
-              <a:t>    "I"=	"American Indian/Alaskan Native",</a:t>
-            </a:r>
-          </a:p>
-          <a:p>
-            <a:r>
-              <a:rPr lang="en-US" dirty="0">
+              <a:rPr lang="en-US" sz="1600" dirty="0">
+                <a:solidFill>
+                  <a:schemeClr val="tx1"/>
+                </a:solidFill>
+              </a:rPr>
+              <a:t>    "I"=	"Am Indian",</a:t>
+            </a:r>
+          </a:p>
+          <a:p>
+            <a:r>
+              <a:rPr lang="en-US" sz="1600" dirty="0">
                 <a:solidFill>
                   <a:schemeClr val="tx1"/>
                 </a:solidFill>
@@ -3503,7 +3504,7 @@
           </a:p>
           <a:p>
             <a:r>
-              <a:rPr lang="en-US" dirty="0">
+              <a:rPr lang="en-US" sz="1600" dirty="0">
                 <a:solidFill>
                   <a:schemeClr val="tx1"/>
                 </a:solidFill>
@@ -3513,7 +3514,7 @@
           </a:p>
           <a:p>
             <a:r>
-              <a:rPr lang="en-US" dirty="0">
+              <a:rPr lang="en-US" sz="1600" dirty="0">
                 <a:solidFill>
                   <a:schemeClr val="tx1"/>
                 </a:solidFill>
@@ -3523,7 +3524,7 @@
           </a:p>
           <a:p>
             <a:r>
-              <a:rPr lang="en-US" dirty="0">
+              <a:rPr lang="en-US" sz="1600" dirty="0">
                 <a:solidFill>
                   <a:schemeClr val="tx1"/>
                 </a:solidFill>
@@ -3533,7 +3534,7 @@
           </a:p>
           <a:p>
             <a:r>
-              <a:rPr lang="en-US" dirty="0">
+              <a:rPr lang="en-US" sz="1600" dirty="0">
                 <a:solidFill>
                   <a:schemeClr val="tx1"/>
                 </a:solidFill>
@@ -3543,7 +3544,7 @@
           </a:p>
           <a:p>
             <a:r>
-              <a:rPr lang="en-US" dirty="0">
+              <a:rPr lang="en-US" sz="1600" dirty="0">
                 <a:solidFill>
                   <a:schemeClr val="tx1"/>
                 </a:solidFill>
@@ -3551,7 +3552,7 @@
               <a:t>    .default = </a:t>
             </a:r>
             <a:r>
-              <a:rPr lang="en-US" dirty="0" err="1">
+              <a:rPr lang="en-US" sz="1600" dirty="0" err="1">
                 <a:solidFill>
                   <a:schemeClr val="tx1"/>
                 </a:solidFill>
@@ -3559,12 +3560,22 @@
               <a:t>NA_character</a:t>
             </a:r>
             <a:r>
-              <a:rPr lang="en-US" dirty="0">
-                <a:solidFill>
-                  <a:schemeClr val="tx1"/>
-                </a:solidFill>
-              </a:rPr>
-              <a:t>_  )</a:t>
+              <a:rPr lang="en-US" sz="1600" dirty="0">
+                <a:solidFill>
+                  <a:schemeClr val="tx1"/>
+                </a:solidFill>
+              </a:rPr>
+              <a:t>_</a:t>
+            </a:r>
+          </a:p>
+          <a:p>
+            <a:r>
+              <a:rPr lang="en-US" sz="1600" dirty="0">
+                <a:solidFill>
+                  <a:schemeClr val="tx1"/>
+                </a:solidFill>
+              </a:rPr>
+              <a:t>  )</a:t>
             </a:r>
           </a:p>
         </p:txBody>
@@ -3621,7 +3632,53 @@
                   <a:schemeClr val="tx1"/>
                 </a:solidFill>
               </a:rPr>
-              <a:t>count(x= sqf_2011, race) </a:t>
+              <a:t>sqf_2011 &lt;-</a:t>
+            </a:r>
+          </a:p>
+          <a:p>
+            <a:r>
+              <a:rPr lang="en-US" dirty="0">
+                <a:solidFill>
+                  <a:schemeClr val="tx1"/>
+                </a:solidFill>
+              </a:rPr>
+              <a:t>sqf_2011  |&gt;</a:t>
+            </a:r>
+          </a:p>
+          <a:p>
+            <a:r>
+              <a:rPr lang="en-US" dirty="0">
+                <a:solidFill>
+                  <a:schemeClr val="tx1"/>
+                </a:solidFill>
+              </a:rPr>
+              <a:t>  select( sex,  race,  </a:t>
+            </a:r>
+            <a:r>
+              <a:rPr lang="en-US" dirty="0" err="1">
+                <a:solidFill>
+                  <a:schemeClr val="tx1"/>
+                </a:solidFill>
+              </a:rPr>
+              <a:t>arstmade</a:t>
+            </a:r>
+            <a:r>
+              <a:rPr lang="en-US" dirty="0">
+                <a:solidFill>
+                  <a:schemeClr val="tx1"/>
+                </a:solidFill>
+              </a:rPr>
+              <a:t> </a:t>
+            </a:r>
+          </a:p>
+          <a:p>
+            <a:r>
+              <a:rPr lang="en-US" dirty="0">
+                <a:solidFill>
+                  <a:schemeClr val="tx1"/>
+                </a:solidFill>
+              </a:rPr>
+              <a:t>         )</a:t>
             </a:r>
           </a:p>
         </p:txBody>
@@ -3708,7 +3765,7 @@
                   <a:schemeClr val="tx1"/>
                 </a:solidFill>
               </a:rPr>
-              <a:t>select(</a:t>
+              <a:t>sqf_2011 |&gt;</a:t>
             </a:r>
           </a:p>
           <a:p>
@@ -3718,66 +3775,25 @@
                   <a:schemeClr val="tx1"/>
                 </a:solidFill>
               </a:rPr>
-              <a:t>data = sqf_2021, </a:t>
-            </a:r>
-          </a:p>
-          <a:p>
+              <a:t>  </a:t>
+            </a:r>
+            <a:r>
+              <a:rPr lang="en-US" dirty="0" err="1">
+                <a:solidFill>
+                  <a:schemeClr val="tx1"/>
+                </a:solidFill>
+              </a:rPr>
+              <a:t>group_by</a:t>
+            </a:r>
             <a:r>
               <a:rPr lang="en-US" dirty="0">
                 <a:solidFill>
                   <a:schemeClr val="tx1"/>
                 </a:solidFill>
               </a:rPr>
-              <a:t>SUSPECT_SEX, SUSPECT_RACE_DESCRIPTION, SUSPECT_REPORTED_AGE)</a:t>
-            </a:r>
-          </a:p>
-        </p:txBody>
-      </p:sp>
-      <p:sp>
-        <p:nvSpPr>
-          <p:cNvPr id="5" name="Right Arrow 4">
-            <a:extLst>
-              <a:ext uri="{FF2B5EF4-FFF2-40B4-BE49-F238E27FC236}">
-                <a16:creationId xmlns:a16="http://schemas.microsoft.com/office/drawing/2014/main" id="{C1A89E16-15A7-CCF1-0521-2405C979CC6D}"/>
-              </a:ext>
-            </a:extLst>
-          </p:cNvPr>
-          <p:cNvSpPr/>
-          <p:nvPr/>
-        </p:nvSpPr>
-        <p:spPr>
-          <a:xfrm>
-            <a:off x="4545545" y="112542"/>
-            <a:ext cx="7355723" cy="6625883"/>
-          </a:xfrm>
-          <a:prstGeom prst="rightArrow">
-            <a:avLst/>
-          </a:prstGeom>
-          <a:solidFill>
-            <a:schemeClr val="bg1">
-              <a:lumMod val="75000"/>
-            </a:schemeClr>
-          </a:solidFill>
-        </p:spPr>
-        <p:style>
-          <a:lnRef idx="2">
-            <a:schemeClr val="accent1">
-              <a:shade val="50000"/>
-            </a:schemeClr>
-          </a:lnRef>
-          <a:fillRef idx="1">
-            <a:schemeClr val="accent1"/>
-          </a:fillRef>
-          <a:effectRef idx="0">
-            <a:schemeClr val="accent1"/>
-          </a:effectRef>
-          <a:fontRef idx="minor">
-            <a:schemeClr val="lt1"/>
-          </a:fontRef>
-        </p:style>
-        <p:txBody>
-          <a:bodyPr rtlCol="0" anchor="ctr"/>
-          <a:lstStyle/>
+              <a:t>(race) |&gt;</a:t>
+            </a:r>
+          </a:p>
           <a:p>
             <a:r>
               <a:rPr lang="en-US" dirty="0">
@@ -3785,133 +3801,39 @@
                   <a:schemeClr val="tx1"/>
                 </a:solidFill>
               </a:rPr>
-              <a:t>recode(</a:t>
-            </a:r>
-          </a:p>
-          <a:p>
+              <a:t>  </a:t>
+            </a:r>
+            <a:r>
+              <a:rPr lang="en-US" dirty="0" err="1">
+                <a:solidFill>
+                  <a:schemeClr val="tx1"/>
+                </a:solidFill>
+              </a:rPr>
+              <a:t>summarise</a:t>
+            </a:r>
             <a:r>
               <a:rPr lang="en-US" dirty="0">
                 <a:solidFill>
                   <a:schemeClr val="tx1"/>
                 </a:solidFill>
               </a:rPr>
-              <a:t>    sqf_2021$race,</a:t>
-            </a:r>
-          </a:p>
-          <a:p>
+              <a:t>(</a:t>
+            </a:r>
+            <a:r>
+              <a:rPr lang="en-US" dirty="0" err="1">
+                <a:solidFill>
+                  <a:schemeClr val="tx1"/>
+                </a:solidFill>
+              </a:rPr>
+              <a:t>stops_by_race</a:t>
+            </a:r>
             <a:r>
               <a:rPr lang="en-US" dirty="0">
                 <a:solidFill>
                   <a:schemeClr val="tx1"/>
                 </a:solidFill>
               </a:rPr>
-              <a:t>    "BLACK HISPANIC" = "Hispanic",</a:t>
-            </a:r>
-          </a:p>
-          <a:p>
-            <a:r>
-              <a:rPr lang="en-US" dirty="0">
-                <a:solidFill>
-                  <a:schemeClr val="tx1"/>
-                </a:solidFill>
-              </a:rPr>
-              <a:t>    "WHITE HISPANIC"= "Hispanic",</a:t>
-            </a:r>
-          </a:p>
-          <a:p>
-            <a:r>
-              <a:rPr lang="en-US" dirty="0">
-                <a:solidFill>
-                  <a:schemeClr val="tx1"/>
-                </a:solidFill>
-              </a:rPr>
-              <a:t>    "BLACK"= "Black",</a:t>
-            </a:r>
-          </a:p>
-          <a:p>
-            <a:r>
-              <a:rPr lang="en-US" dirty="0">
-                <a:solidFill>
-                  <a:schemeClr val="tx1"/>
-                </a:solidFill>
-              </a:rPr>
-              <a:t>    "WHITE"= "White",</a:t>
-            </a:r>
-          </a:p>
-          <a:p>
-            <a:r>
-              <a:rPr lang="en-US" dirty="0">
-                <a:solidFill>
-                  <a:schemeClr val="tx1"/>
-                </a:solidFill>
-              </a:rPr>
-              <a:t>    "MIDDLE EASTERN/SOUTHWEST ASIAN"= "MESA",</a:t>
-            </a:r>
-          </a:p>
-          <a:p>
-            <a:r>
-              <a:rPr lang="en-US" dirty="0">
-                <a:solidFill>
-                  <a:schemeClr val="tx1"/>
-                </a:solidFill>
-              </a:rPr>
-              <a:t>    "ASIAN / PACIFIC ISLANDER"= "API",</a:t>
-            </a:r>
-          </a:p>
-          <a:p>
-            <a:r>
-              <a:rPr lang="en-US" dirty="0">
-                <a:solidFill>
-                  <a:schemeClr val="tx1"/>
-                </a:solidFill>
-              </a:rPr>
-              <a:t>    "AMERICAN INDIAN/ALASKAN NATIVE"= "AMAN",</a:t>
-            </a:r>
-          </a:p>
-          <a:p>
-            <a:r>
-              <a:rPr lang="en-US" dirty="0">
-                <a:solidFill>
-                  <a:schemeClr val="tx1"/>
-                </a:solidFill>
-              </a:rPr>
-              <a:t>    "no data"= "no data",</a:t>
-            </a:r>
-          </a:p>
-          <a:p>
-            <a:r>
-              <a:rPr lang="en-US" dirty="0">
-                <a:solidFill>
-                  <a:schemeClr val="tx1"/>
-                </a:solidFill>
-              </a:rPr>
-              <a:t>    .default = </a:t>
-            </a:r>
-            <a:r>
-              <a:rPr lang="en-US" dirty="0" err="1">
-                <a:solidFill>
-                  <a:schemeClr val="tx1"/>
-                </a:solidFill>
-              </a:rPr>
-              <a:t>NA_character</a:t>
-            </a:r>
-            <a:r>
-              <a:rPr lang="en-US" dirty="0">
-                <a:solidFill>
-                  <a:schemeClr val="tx1"/>
-                </a:solidFill>
-              </a:rPr>
-              <a:t>_</a:t>
-            </a:r>
-          </a:p>
-          <a:p>
-            <a:r>
-              <a:rPr lang="en-US" dirty="0">
-                <a:solidFill>
-                  <a:schemeClr val="tx1"/>
-                </a:solidFill>
-              </a:rPr>
-              <a:t>  )</a:t>
+              <a:t> = n() ) </a:t>
             </a:r>
           </a:p>
         </p:txBody>
@@ -3963,13 +3885,331 @@
           <a:lstStyle/>
           <a:p>
             <a:r>
-              <a:rPr lang="en-US" dirty="0">
-                <a:solidFill>
-                  <a:schemeClr val="tx1"/>
-                </a:solidFill>
-              </a:rPr>
-              <a:t>count(x= sqf_2021, race) </a:t>
-            </a:r>
+              <a:rPr lang="en-US" sz="1600" dirty="0">
+                <a:solidFill>
+                  <a:schemeClr val="tx1"/>
+                </a:solidFill>
+              </a:rPr>
+              <a:t>sqf_2011$arstmade&lt;-</a:t>
+            </a:r>
+          </a:p>
+          <a:p>
+            <a:r>
+              <a:rPr lang="en-US" sz="1600" dirty="0">
+                <a:solidFill>
+                  <a:schemeClr val="tx1"/>
+                </a:solidFill>
+              </a:rPr>
+              <a:t>  recode(</a:t>
+            </a:r>
+          </a:p>
+          <a:p>
+            <a:r>
+              <a:rPr lang="en-US" sz="1600" dirty="0">
+                <a:solidFill>
+                  <a:schemeClr val="tx1"/>
+                </a:solidFill>
+              </a:rPr>
+              <a:t>    sqf_2011$arstmade, </a:t>
+            </a:r>
+          </a:p>
+          <a:p>
+            <a:r>
+              <a:rPr lang="en-US" sz="1600" dirty="0">
+                <a:solidFill>
+                  <a:schemeClr val="tx1"/>
+                </a:solidFill>
+              </a:rPr>
+              <a:t>    "Y"          = 1,</a:t>
+            </a:r>
+          </a:p>
+          <a:p>
+            <a:r>
+              <a:rPr lang="en-US" sz="1600" dirty="0">
+                <a:solidFill>
+                  <a:schemeClr val="tx1"/>
+                </a:solidFill>
+              </a:rPr>
+              <a:t>    "N"	= 0</a:t>
+            </a:r>
+          </a:p>
+          <a:p>
+            <a:r>
+              <a:rPr lang="en-US" sz="1600" dirty="0">
+                <a:solidFill>
+                  <a:schemeClr val="tx1"/>
+                </a:solidFill>
+              </a:rPr>
+              <a:t>  )</a:t>
+            </a:r>
+          </a:p>
+        </p:txBody>
+      </p:sp>
+      <p:sp>
+        <p:nvSpPr>
+          <p:cNvPr id="8" name="Right Arrow 7">
+            <a:extLst>
+              <a:ext uri="{FF2B5EF4-FFF2-40B4-BE49-F238E27FC236}">
+                <a16:creationId xmlns:a16="http://schemas.microsoft.com/office/drawing/2014/main" id="{48DC8A7A-B6F7-3756-00A0-8D76D761C404}"/>
+              </a:ext>
+            </a:extLst>
+          </p:cNvPr>
+          <p:cNvSpPr/>
+          <p:nvPr/>
+        </p:nvSpPr>
+        <p:spPr>
+          <a:xfrm>
+            <a:off x="4336473" y="112542"/>
+            <a:ext cx="7564795" cy="6625883"/>
+          </a:xfrm>
+          <a:prstGeom prst="rightArrow">
+            <a:avLst/>
+          </a:prstGeom>
+          <a:solidFill>
+            <a:schemeClr val="bg1">
+              <a:lumMod val="75000"/>
+            </a:schemeClr>
+          </a:solidFill>
+        </p:spPr>
+        <p:style>
+          <a:lnRef idx="2">
+            <a:schemeClr val="accent1">
+              <a:shade val="50000"/>
+            </a:schemeClr>
+          </a:lnRef>
+          <a:fillRef idx="1">
+            <a:schemeClr val="accent1"/>
+          </a:fillRef>
+          <a:effectRef idx="0">
+            <a:schemeClr val="accent1"/>
+          </a:effectRef>
+          <a:fontRef idx="minor">
+            <a:schemeClr val="lt1"/>
+          </a:fontRef>
+        </p:style>
+        <p:txBody>
+          <a:bodyPr rtlCol="0" anchor="ctr"/>
+          <a:lstStyle/>
+          <a:p>
+            <a:r>
+              <a:rPr lang="en-US" sz="1600" dirty="0">
+                <a:solidFill>
+                  <a:schemeClr val="tx1"/>
+                </a:solidFill>
+              </a:rPr>
+              <a:t>sqf_2011 |&gt; </a:t>
+            </a:r>
+          </a:p>
+          <a:p>
+            <a:r>
+              <a:rPr lang="en-US" sz="1600" dirty="0">
+                <a:solidFill>
+                  <a:schemeClr val="tx1"/>
+                </a:solidFill>
+              </a:rPr>
+              <a:t>  </a:t>
+            </a:r>
+            <a:r>
+              <a:rPr lang="en-US" sz="1600" dirty="0" err="1">
+                <a:solidFill>
+                  <a:schemeClr val="tx1"/>
+                </a:solidFill>
+              </a:rPr>
+              <a:t>group_by</a:t>
+            </a:r>
+            <a:r>
+              <a:rPr lang="en-US" sz="1600" dirty="0">
+                <a:solidFill>
+                  <a:schemeClr val="tx1"/>
+                </a:solidFill>
+              </a:rPr>
+              <a:t>(race) |&gt;</a:t>
+            </a:r>
+          </a:p>
+          <a:p>
+            <a:r>
+              <a:rPr lang="en-US" sz="1600" dirty="0">
+                <a:solidFill>
+                  <a:schemeClr val="tx1"/>
+                </a:solidFill>
+              </a:rPr>
+              <a:t>  </a:t>
+            </a:r>
+            <a:r>
+              <a:rPr lang="en-US" sz="1600" dirty="0" err="1">
+                <a:solidFill>
+                  <a:schemeClr val="tx1"/>
+                </a:solidFill>
+              </a:rPr>
+              <a:t>summarise</a:t>
+            </a:r>
+            <a:r>
+              <a:rPr lang="en-US" sz="1600" dirty="0">
+                <a:solidFill>
+                  <a:schemeClr val="tx1"/>
+                </a:solidFill>
+              </a:rPr>
+              <a:t>(</a:t>
+            </a:r>
+            <a:r>
+              <a:rPr lang="en-US" sz="1600" dirty="0" err="1">
+                <a:solidFill>
+                  <a:schemeClr val="tx1"/>
+                </a:solidFill>
+              </a:rPr>
+              <a:t>stops_by_race</a:t>
+            </a:r>
+            <a:r>
+              <a:rPr lang="en-US" sz="1600" dirty="0">
+                <a:solidFill>
+                  <a:schemeClr val="tx1"/>
+                </a:solidFill>
+              </a:rPr>
+              <a:t> = n(),</a:t>
+            </a:r>
+          </a:p>
+          <a:p>
+            <a:r>
+              <a:rPr lang="en-US" sz="1600" dirty="0">
+                <a:solidFill>
+                  <a:schemeClr val="tx1"/>
+                </a:solidFill>
+              </a:rPr>
+              <a:t>            </a:t>
+            </a:r>
+            <a:r>
+              <a:rPr lang="en-US" sz="1600" dirty="0" err="1">
+                <a:solidFill>
+                  <a:schemeClr val="tx1"/>
+                </a:solidFill>
+              </a:rPr>
+              <a:t>percent_stopped</a:t>
+            </a:r>
+            <a:r>
+              <a:rPr lang="en-US" sz="1600" dirty="0">
+                <a:solidFill>
+                  <a:schemeClr val="tx1"/>
+                </a:solidFill>
+              </a:rPr>
+              <a:t> = n() / </a:t>
+            </a:r>
+            <a:r>
+              <a:rPr lang="en-US" sz="1600" dirty="0" err="1">
+                <a:solidFill>
+                  <a:schemeClr val="tx1"/>
+                </a:solidFill>
+              </a:rPr>
+              <a:t>total_stops</a:t>
+            </a:r>
+            <a:r>
+              <a:rPr lang="en-US" sz="1600" dirty="0">
+                <a:solidFill>
+                  <a:schemeClr val="tx1"/>
+                </a:solidFill>
+              </a:rPr>
+              <a:t> *100,</a:t>
+            </a:r>
+          </a:p>
+          <a:p>
+            <a:r>
+              <a:rPr lang="en-US" sz="1600" dirty="0">
+                <a:solidFill>
+                  <a:schemeClr val="tx1"/>
+                </a:solidFill>
+              </a:rPr>
+              <a:t>            </a:t>
+            </a:r>
+            <a:r>
+              <a:rPr lang="en-US" sz="1600" dirty="0" err="1">
+                <a:solidFill>
+                  <a:schemeClr val="tx1"/>
+                </a:solidFill>
+              </a:rPr>
+              <a:t>percent_arrested</a:t>
+            </a:r>
+            <a:r>
+              <a:rPr lang="en-US" sz="1600" dirty="0">
+                <a:solidFill>
+                  <a:schemeClr val="tx1"/>
+                </a:solidFill>
+              </a:rPr>
+              <a:t> = sum(</a:t>
+            </a:r>
+            <a:r>
+              <a:rPr lang="en-US" sz="1600" dirty="0" err="1">
+                <a:solidFill>
+                  <a:schemeClr val="tx1"/>
+                </a:solidFill>
+              </a:rPr>
+              <a:t>arstmade</a:t>
+            </a:r>
+            <a:r>
+              <a:rPr lang="en-US" sz="1600" dirty="0">
+                <a:solidFill>
+                  <a:schemeClr val="tx1"/>
+                </a:solidFill>
+              </a:rPr>
+              <a:t>)/  </a:t>
+            </a:r>
+            <a:r>
+              <a:rPr lang="en-US" sz="1600" dirty="0" err="1">
+                <a:solidFill>
+                  <a:schemeClr val="tx1"/>
+                </a:solidFill>
+              </a:rPr>
+              <a:t>stops_by_race</a:t>
+            </a:r>
+            <a:r>
+              <a:rPr lang="en-US" sz="1600" dirty="0">
+                <a:solidFill>
+                  <a:schemeClr val="tx1"/>
+                </a:solidFill>
+              </a:rPr>
+              <a:t> *100</a:t>
+            </a:r>
+          </a:p>
+          <a:p>
+            <a:r>
+              <a:rPr lang="en-US" sz="1600" dirty="0">
+                <a:solidFill>
+                  <a:schemeClr val="tx1"/>
+                </a:solidFill>
+              </a:rPr>
+              <a:t>  )|&gt;</a:t>
+            </a:r>
+          </a:p>
+          <a:p>
+            <a:r>
+              <a:rPr lang="en-US" sz="1600" dirty="0">
+                <a:solidFill>
+                  <a:schemeClr val="tx1"/>
+                </a:solidFill>
+              </a:rPr>
+              <a:t>  arrange(</a:t>
+            </a:r>
+            <a:r>
+              <a:rPr lang="en-US" sz="1600" dirty="0" err="1">
+                <a:solidFill>
+                  <a:schemeClr val="tx1"/>
+                </a:solidFill>
+              </a:rPr>
+              <a:t>percent_arrested</a:t>
+            </a:r>
+            <a:r>
+              <a:rPr lang="en-US" sz="1600" dirty="0">
+                <a:solidFill>
+                  <a:schemeClr val="tx1"/>
+                </a:solidFill>
+              </a:rPr>
+              <a:t>) </a:t>
+            </a:r>
+          </a:p>
+          <a:p>
+            <a:endParaRPr lang="en-US" sz="1600" dirty="0">
+              <a:solidFill>
+                <a:schemeClr val="tx1"/>
+              </a:solidFill>
+            </a:endParaRPr>
           </a:p>
         </p:txBody>
       </p:sp>
@@ -4017,8 +4257,8 @@
         </p:nvSpPr>
         <p:spPr>
           <a:xfrm>
-            <a:off x="571210" y="224590"/>
-            <a:ext cx="3519527" cy="2736660"/>
+            <a:off x="224847" y="0"/>
+            <a:ext cx="6092826" cy="4642669"/>
           </a:xfrm>
           <a:prstGeom prst="rightArrow">
             <a:avLst/>
@@ -4050,22 +4290,148 @@
           <a:lstStyle/>
           <a:p>
             <a:r>
-              <a:rPr lang="en-US" dirty="0">
-                <a:solidFill>
-                  <a:schemeClr val="tx1"/>
-                </a:solidFill>
-              </a:rPr>
-              <a:t>rename(</a:t>
-            </a:r>
-          </a:p>
-          <a:p>
-            <a:r>
-              <a:rPr lang="en-US" dirty="0">
-                <a:solidFill>
-                  <a:schemeClr val="tx1"/>
-                </a:solidFill>
-              </a:rPr>
-              <a:t>data= sqf_2011, total = n )</a:t>
+              <a:rPr lang="en-US" sz="1600" dirty="0">
+                <a:solidFill>
+                  <a:schemeClr val="tx1"/>
+                </a:solidFill>
+              </a:rPr>
+              <a:t>sqf_2011 |&gt; </a:t>
+            </a:r>
+          </a:p>
+          <a:p>
+            <a:r>
+              <a:rPr lang="en-US" sz="1600" dirty="0">
+                <a:solidFill>
+                  <a:schemeClr val="tx1"/>
+                </a:solidFill>
+              </a:rPr>
+              <a:t>  </a:t>
+            </a:r>
+            <a:r>
+              <a:rPr lang="en-US" sz="1600" dirty="0" err="1">
+                <a:solidFill>
+                  <a:schemeClr val="tx1"/>
+                </a:solidFill>
+              </a:rPr>
+              <a:t>group_by</a:t>
+            </a:r>
+            <a:r>
+              <a:rPr lang="en-US" sz="1600" dirty="0">
+                <a:solidFill>
+                  <a:schemeClr val="tx1"/>
+                </a:solidFill>
+              </a:rPr>
+              <a:t>(race) |&gt;</a:t>
+            </a:r>
+          </a:p>
+          <a:p>
+            <a:r>
+              <a:rPr lang="en-US" sz="1600" dirty="0">
+                <a:solidFill>
+                  <a:schemeClr val="tx1"/>
+                </a:solidFill>
+              </a:rPr>
+              <a:t>  </a:t>
+            </a:r>
+            <a:r>
+              <a:rPr lang="en-US" sz="1600" dirty="0" err="1">
+                <a:solidFill>
+                  <a:schemeClr val="tx1"/>
+                </a:solidFill>
+              </a:rPr>
+              <a:t>summarise</a:t>
+            </a:r>
+            <a:r>
+              <a:rPr lang="en-US" sz="1600" dirty="0">
+                <a:solidFill>
+                  <a:schemeClr val="tx1"/>
+                </a:solidFill>
+              </a:rPr>
+              <a:t>(</a:t>
+            </a:r>
+            <a:r>
+              <a:rPr lang="en-US" sz="1600" dirty="0" err="1">
+                <a:solidFill>
+                  <a:schemeClr val="tx1"/>
+                </a:solidFill>
+              </a:rPr>
+              <a:t>stops_by_race</a:t>
+            </a:r>
+            <a:r>
+              <a:rPr lang="en-US" sz="1600" dirty="0">
+                <a:solidFill>
+                  <a:schemeClr val="tx1"/>
+                </a:solidFill>
+              </a:rPr>
+              <a:t> = n(),</a:t>
+            </a:r>
+          </a:p>
+          <a:p>
+            <a:r>
+              <a:rPr lang="en-US" sz="1600" dirty="0">
+                <a:solidFill>
+                  <a:schemeClr val="tx1"/>
+                </a:solidFill>
+              </a:rPr>
+              <a:t>            	</a:t>
+            </a:r>
+            <a:r>
+              <a:rPr lang="en-US" sz="1600" dirty="0" err="1">
+                <a:solidFill>
+                  <a:schemeClr val="tx1"/>
+                </a:solidFill>
+              </a:rPr>
+              <a:t>percent_stopped</a:t>
+            </a:r>
+            <a:r>
+              <a:rPr lang="en-US" sz="1600" dirty="0">
+                <a:solidFill>
+                  <a:schemeClr val="tx1"/>
+                </a:solidFill>
+              </a:rPr>
+              <a:t> =  </a:t>
+            </a:r>
+            <a:r>
+              <a:rPr lang="en-US" sz="1600" dirty="0" err="1">
+                <a:solidFill>
+                  <a:schemeClr val="tx1"/>
+                </a:solidFill>
+              </a:rPr>
+              <a:t>stops_by_race</a:t>
+            </a:r>
+            <a:r>
+              <a:rPr lang="en-US" sz="1600" dirty="0">
+                <a:solidFill>
+                  <a:schemeClr val="tx1"/>
+                </a:solidFill>
+              </a:rPr>
+              <a:t> / </a:t>
+            </a:r>
+            <a:r>
+              <a:rPr lang="en-US" sz="1600" dirty="0" err="1">
+                <a:solidFill>
+                  <a:schemeClr val="tx1"/>
+                </a:solidFill>
+              </a:rPr>
+              <a:t>total_stops</a:t>
+            </a:r>
+            <a:r>
+              <a:rPr lang="en-US" sz="1600" dirty="0">
+                <a:solidFill>
+                  <a:schemeClr val="tx1"/>
+                </a:solidFill>
+              </a:rPr>
+              <a:t> *100</a:t>
+            </a:r>
+          </a:p>
+          <a:p>
+            <a:r>
+              <a:rPr lang="en-US" sz="1600" dirty="0">
+                <a:solidFill>
+                  <a:schemeClr val="tx1"/>
+                </a:solidFill>
+              </a:rPr>
+              <a:t>  )</a:t>
             </a:r>
           </a:p>
         </p:txBody>
@@ -4084,8 +4450,8 @@
         </p:nvSpPr>
         <p:spPr>
           <a:xfrm>
-            <a:off x="571209" y="3240817"/>
-            <a:ext cx="3744117" cy="3161379"/>
+            <a:off x="5572701" y="2272843"/>
+            <a:ext cx="6619299" cy="4642669"/>
           </a:xfrm>
           <a:prstGeom prst="rightArrow">
             <a:avLst/>
@@ -4117,79 +4483,206 @@
           <a:lstStyle/>
           <a:p>
             <a:r>
-              <a:rPr lang="en-US" dirty="0">
-                <a:solidFill>
-                  <a:schemeClr val="tx1"/>
-                </a:solidFill>
-              </a:rPr>
-              <a:t>mutate(</a:t>
-            </a:r>
-          </a:p>
-          <a:p>
-            <a:r>
-              <a:rPr lang="en-US" dirty="0">
-                <a:solidFill>
-                  <a:schemeClr val="tx1"/>
-                </a:solidFill>
-              </a:rPr>
-              <a:t>data = sqf_2011, percentage = total/sum(total) * 100 ) </a:t>
-            </a:r>
-          </a:p>
-        </p:txBody>
-      </p:sp>
-      <p:sp>
-        <p:nvSpPr>
-          <p:cNvPr id="12" name="Right Arrow 11">
-            <a:extLst>
-              <a:ext uri="{FF2B5EF4-FFF2-40B4-BE49-F238E27FC236}">
-                <a16:creationId xmlns:a16="http://schemas.microsoft.com/office/drawing/2014/main" id="{8B0B862E-F573-18DA-2578-5A4E38F6DE69}"/>
-              </a:ext>
-            </a:extLst>
-          </p:cNvPr>
-          <p:cNvSpPr/>
-          <p:nvPr/>
-        </p:nvSpPr>
-        <p:spPr>
-          <a:xfrm>
-            <a:off x="6341501" y="224590"/>
-            <a:ext cx="3519527" cy="2736660"/>
-          </a:xfrm>
-          <a:prstGeom prst="rightArrow">
-            <a:avLst/>
-          </a:prstGeom>
-          <a:solidFill>
-            <a:schemeClr val="bg1">
-              <a:lumMod val="75000"/>
-            </a:schemeClr>
-          </a:solidFill>
-        </p:spPr>
-        <p:style>
-          <a:lnRef idx="2">
-            <a:schemeClr val="accent1">
-              <a:shade val="50000"/>
-            </a:schemeClr>
-          </a:lnRef>
-          <a:fillRef idx="1">
-            <a:schemeClr val="accent1"/>
-          </a:fillRef>
-          <a:effectRef idx="0">
-            <a:schemeClr val="accent1"/>
-          </a:effectRef>
-          <a:fontRef idx="minor">
-            <a:schemeClr val="lt1"/>
-          </a:fontRef>
-        </p:style>
-        <p:txBody>
-          <a:bodyPr rtlCol="0" anchor="ctr"/>
-          <a:lstStyle/>
-          <a:p>
-            <a:r>
-              <a:rPr lang="en-US" dirty="0">
-                <a:solidFill>
-                  <a:schemeClr val="tx1"/>
-                </a:solidFill>
-              </a:rPr>
-              <a:t>arrange(data = desc(percentage))</a:t>
+              <a:rPr lang="en-US" sz="1600" dirty="0">
+                <a:solidFill>
+                  <a:schemeClr val="tx1"/>
+                </a:solidFill>
+              </a:rPr>
+              <a:t>sqf_2011 |&gt; </a:t>
+            </a:r>
+          </a:p>
+          <a:p>
+            <a:r>
+              <a:rPr lang="en-US" sz="1600" dirty="0">
+                <a:solidFill>
+                  <a:schemeClr val="tx1"/>
+                </a:solidFill>
+              </a:rPr>
+              <a:t>  </a:t>
+            </a:r>
+            <a:r>
+              <a:rPr lang="en-US" sz="1600" dirty="0" err="1">
+                <a:solidFill>
+                  <a:schemeClr val="tx1"/>
+                </a:solidFill>
+              </a:rPr>
+              <a:t>group_by</a:t>
+            </a:r>
+            <a:r>
+              <a:rPr lang="en-US" sz="1600" dirty="0">
+                <a:solidFill>
+                  <a:schemeClr val="tx1"/>
+                </a:solidFill>
+              </a:rPr>
+              <a:t>(race) |&gt;</a:t>
+            </a:r>
+          </a:p>
+          <a:p>
+            <a:r>
+              <a:rPr lang="en-US" sz="1600" dirty="0">
+                <a:solidFill>
+                  <a:schemeClr val="tx1"/>
+                </a:solidFill>
+              </a:rPr>
+              <a:t>  </a:t>
+            </a:r>
+            <a:r>
+              <a:rPr lang="en-US" sz="1600" dirty="0" err="1">
+                <a:solidFill>
+                  <a:schemeClr val="tx1"/>
+                </a:solidFill>
+              </a:rPr>
+              <a:t>summarise</a:t>
+            </a:r>
+            <a:r>
+              <a:rPr lang="en-US" sz="1600" dirty="0">
+                <a:solidFill>
+                  <a:schemeClr val="tx1"/>
+                </a:solidFill>
+              </a:rPr>
+              <a:t>(</a:t>
+            </a:r>
+            <a:r>
+              <a:rPr lang="en-US" sz="1600" dirty="0" err="1">
+                <a:solidFill>
+                  <a:schemeClr val="tx1"/>
+                </a:solidFill>
+              </a:rPr>
+              <a:t>stops_by_race</a:t>
+            </a:r>
+            <a:r>
+              <a:rPr lang="en-US" sz="1600" dirty="0">
+                <a:solidFill>
+                  <a:schemeClr val="tx1"/>
+                </a:solidFill>
+              </a:rPr>
+              <a:t> = n(),</a:t>
+            </a:r>
+          </a:p>
+          <a:p>
+            <a:r>
+              <a:rPr lang="en-US" sz="1600" dirty="0">
+                <a:solidFill>
+                  <a:schemeClr val="tx1"/>
+                </a:solidFill>
+              </a:rPr>
+              <a:t>            </a:t>
+            </a:r>
+            <a:r>
+              <a:rPr lang="en-US" sz="1600" dirty="0" err="1">
+                <a:solidFill>
+                  <a:schemeClr val="tx1"/>
+                </a:solidFill>
+              </a:rPr>
+              <a:t>percent_stopped</a:t>
+            </a:r>
+            <a:r>
+              <a:rPr lang="en-US" sz="1600" dirty="0">
+                <a:solidFill>
+                  <a:schemeClr val="tx1"/>
+                </a:solidFill>
+              </a:rPr>
+              <a:t> = </a:t>
+            </a:r>
+            <a:r>
+              <a:rPr lang="en-US" sz="1600" dirty="0" err="1">
+                <a:solidFill>
+                  <a:schemeClr val="tx1"/>
+                </a:solidFill>
+              </a:rPr>
+              <a:t>stops_by_race</a:t>
+            </a:r>
+            <a:r>
+              <a:rPr lang="en-US" sz="1600" dirty="0">
+                <a:solidFill>
+                  <a:schemeClr val="tx1"/>
+                </a:solidFill>
+              </a:rPr>
+              <a:t>/ </a:t>
+            </a:r>
+            <a:r>
+              <a:rPr lang="en-US" sz="1600" dirty="0" err="1">
+                <a:solidFill>
+                  <a:schemeClr val="tx1"/>
+                </a:solidFill>
+              </a:rPr>
+              <a:t>total_stops</a:t>
+            </a:r>
+            <a:r>
+              <a:rPr lang="en-US" sz="1600" dirty="0">
+                <a:solidFill>
+                  <a:schemeClr val="tx1"/>
+                </a:solidFill>
+              </a:rPr>
+              <a:t> *100,</a:t>
+            </a:r>
+          </a:p>
+          <a:p>
+            <a:r>
+              <a:rPr lang="en-US" sz="1600" dirty="0">
+                <a:solidFill>
+                  <a:schemeClr val="tx1"/>
+                </a:solidFill>
+              </a:rPr>
+              <a:t>            </a:t>
+            </a:r>
+            <a:r>
+              <a:rPr lang="en-US" sz="1600" dirty="0" err="1">
+                <a:solidFill>
+                  <a:schemeClr val="tx1"/>
+                </a:solidFill>
+              </a:rPr>
+              <a:t>percent_arrested</a:t>
+            </a:r>
+            <a:r>
+              <a:rPr lang="en-US" sz="1600" dirty="0">
+                <a:solidFill>
+                  <a:schemeClr val="tx1"/>
+                </a:solidFill>
+              </a:rPr>
+              <a:t> = sum(</a:t>
+            </a:r>
+            <a:r>
+              <a:rPr lang="en-US" sz="1600" dirty="0" err="1">
+                <a:solidFill>
+                  <a:schemeClr val="tx1"/>
+                </a:solidFill>
+              </a:rPr>
+              <a:t>arstmade</a:t>
+            </a:r>
+            <a:r>
+              <a:rPr lang="en-US" sz="1600" dirty="0">
+                <a:solidFill>
+                  <a:schemeClr val="tx1"/>
+                </a:solidFill>
+              </a:rPr>
+              <a:t>)/ = </a:t>
+            </a:r>
+            <a:r>
+              <a:rPr lang="en-US" sz="1600" dirty="0" err="1">
+                <a:solidFill>
+                  <a:schemeClr val="tx1"/>
+                </a:solidFill>
+              </a:rPr>
+              <a:t>stops_by_race</a:t>
+            </a:r>
+            <a:r>
+              <a:rPr lang="en-US" sz="1600" dirty="0">
+                <a:solidFill>
+                  <a:schemeClr val="tx1"/>
+                </a:solidFill>
+              </a:rPr>
+              <a:t> *100</a:t>
+            </a:r>
+          </a:p>
+          <a:p>
+            <a:r>
+              <a:rPr lang="en-US" sz="1600" dirty="0">
+                <a:solidFill>
+                  <a:schemeClr val="tx1"/>
+                </a:solidFill>
+              </a:rPr>
+              <a:t>  )</a:t>
             </a:r>
           </a:p>
         </p:txBody>
@@ -4226,10 +4719,10 @@
       </p:grpSpPr>
       <p:sp>
         <p:nvSpPr>
-          <p:cNvPr id="4" name="Right Arrow 3">
-            <a:extLst>
-              <a:ext uri="{FF2B5EF4-FFF2-40B4-BE49-F238E27FC236}">
-                <a16:creationId xmlns:a16="http://schemas.microsoft.com/office/drawing/2014/main" id="{8C88B12D-2EF6-E916-EA08-686BF9510A8B}"/>
+          <p:cNvPr id="6" name="Right Arrow 5">
+            <a:extLst>
+              <a:ext uri="{FF2B5EF4-FFF2-40B4-BE49-F238E27FC236}">
+                <a16:creationId xmlns:a16="http://schemas.microsoft.com/office/drawing/2014/main" id="{5E8A6CC6-84FA-1A29-658B-F50298418520}"/>
               </a:ext>
             </a:extLst>
           </p:cNvPr>
@@ -4238,8 +4731,8 @@
         </p:nvSpPr>
         <p:spPr>
           <a:xfrm>
-            <a:off x="571210" y="224590"/>
-            <a:ext cx="3519527" cy="2736660"/>
+            <a:off x="4336473" y="112542"/>
+            <a:ext cx="7564795" cy="6625883"/>
           </a:xfrm>
           <a:prstGeom prst="rightArrow">
             <a:avLst/>
@@ -4271,32 +4764,364 @@
           <a:lstStyle/>
           <a:p>
             <a:r>
-              <a:rPr lang="en-US" dirty="0">
-                <a:solidFill>
-                  <a:schemeClr val="tx1"/>
-                </a:solidFill>
-              </a:rPr>
-              <a:t>rename(</a:t>
-            </a:r>
-          </a:p>
-          <a:p>
-            <a:r>
-              <a:rPr lang="en-US" dirty="0">
-                <a:solidFill>
-                  <a:schemeClr val="tx1"/>
-                </a:solidFill>
-              </a:rPr>
-              <a:t>data= sqf_2021, total = n )</a:t>
-            </a:r>
-          </a:p>
-        </p:txBody>
-      </p:sp>
-      <p:sp>
-        <p:nvSpPr>
-          <p:cNvPr id="9" name="Right Arrow 8">
-            <a:extLst>
-              <a:ext uri="{FF2B5EF4-FFF2-40B4-BE49-F238E27FC236}">
-                <a16:creationId xmlns:a16="http://schemas.microsoft.com/office/drawing/2014/main" id="{3E9EF86B-D410-AF10-5B00-7D7CA6171BFC}"/>
+              <a:rPr lang="en-US" sz="1600" dirty="0">
+                <a:solidFill>
+                  <a:schemeClr val="tx1"/>
+                </a:solidFill>
+              </a:rPr>
+              <a:t>sqf_2011 |&gt; </a:t>
+            </a:r>
+          </a:p>
+          <a:p>
+            <a:r>
+              <a:rPr lang="en-US" sz="1600" dirty="0">
+                <a:solidFill>
+                  <a:schemeClr val="tx1"/>
+                </a:solidFill>
+              </a:rPr>
+              <a:t>  </a:t>
+            </a:r>
+            <a:r>
+              <a:rPr lang="en-US" sz="1600" dirty="0" err="1">
+                <a:solidFill>
+                  <a:schemeClr val="tx1"/>
+                </a:solidFill>
+              </a:rPr>
+              <a:t>group_by</a:t>
+            </a:r>
+            <a:r>
+              <a:rPr lang="en-US" sz="1600" dirty="0">
+                <a:solidFill>
+                  <a:schemeClr val="tx1"/>
+                </a:solidFill>
+              </a:rPr>
+              <a:t>(race) |&gt;</a:t>
+            </a:r>
+          </a:p>
+          <a:p>
+            <a:r>
+              <a:rPr lang="en-US" sz="1600" dirty="0">
+                <a:solidFill>
+                  <a:schemeClr val="tx1"/>
+                </a:solidFill>
+              </a:rPr>
+              <a:t>  </a:t>
+            </a:r>
+            <a:r>
+              <a:rPr lang="en-US" sz="1600" dirty="0" err="1">
+                <a:solidFill>
+                  <a:schemeClr val="tx1"/>
+                </a:solidFill>
+              </a:rPr>
+              <a:t>summarise</a:t>
+            </a:r>
+            <a:r>
+              <a:rPr lang="en-US" sz="1600" dirty="0">
+                <a:solidFill>
+                  <a:schemeClr val="tx1"/>
+                </a:solidFill>
+              </a:rPr>
+              <a:t>(</a:t>
+            </a:r>
+            <a:r>
+              <a:rPr lang="en-US" sz="1600" dirty="0" err="1">
+                <a:solidFill>
+                  <a:schemeClr val="tx1"/>
+                </a:solidFill>
+              </a:rPr>
+              <a:t>stops_by_race</a:t>
+            </a:r>
+            <a:r>
+              <a:rPr lang="en-US" sz="1600" dirty="0">
+                <a:solidFill>
+                  <a:schemeClr val="tx1"/>
+                </a:solidFill>
+              </a:rPr>
+              <a:t> = n(),</a:t>
+            </a:r>
+          </a:p>
+          <a:p>
+            <a:r>
+              <a:rPr lang="en-US" sz="1600" dirty="0">
+                <a:solidFill>
+                  <a:schemeClr val="tx1"/>
+                </a:solidFill>
+              </a:rPr>
+              <a:t>            </a:t>
+            </a:r>
+            <a:r>
+              <a:rPr lang="en-US" sz="1600" dirty="0" err="1">
+                <a:solidFill>
+                  <a:schemeClr val="tx1"/>
+                </a:solidFill>
+              </a:rPr>
+              <a:t>percent_stopped</a:t>
+            </a:r>
+            <a:r>
+              <a:rPr lang="en-US" sz="1600" dirty="0">
+                <a:solidFill>
+                  <a:schemeClr val="tx1"/>
+                </a:solidFill>
+              </a:rPr>
+              <a:t> = </a:t>
+            </a:r>
+            <a:r>
+              <a:rPr lang="en-US" sz="1600" dirty="0" err="1">
+                <a:solidFill>
+                  <a:schemeClr val="tx1"/>
+                </a:solidFill>
+              </a:rPr>
+              <a:t>stops_by_race</a:t>
+            </a:r>
+            <a:r>
+              <a:rPr lang="en-US" sz="1600" dirty="0">
+                <a:solidFill>
+                  <a:schemeClr val="tx1"/>
+                </a:solidFill>
+              </a:rPr>
+              <a:t> / </a:t>
+            </a:r>
+            <a:r>
+              <a:rPr lang="en-US" sz="1600" dirty="0" err="1">
+                <a:solidFill>
+                  <a:schemeClr val="tx1"/>
+                </a:solidFill>
+              </a:rPr>
+              <a:t>total_stops</a:t>
+            </a:r>
+            <a:r>
+              <a:rPr lang="en-US" sz="1600" dirty="0">
+                <a:solidFill>
+                  <a:schemeClr val="tx1"/>
+                </a:solidFill>
+              </a:rPr>
+              <a:t> *100,</a:t>
+            </a:r>
+          </a:p>
+          <a:p>
+            <a:r>
+              <a:rPr lang="en-US" sz="1600" dirty="0">
+                <a:solidFill>
+                  <a:schemeClr val="tx1"/>
+                </a:solidFill>
+              </a:rPr>
+              <a:t>            </a:t>
+            </a:r>
+            <a:r>
+              <a:rPr lang="en-US" sz="1600" dirty="0" err="1">
+                <a:solidFill>
+                  <a:schemeClr val="tx1"/>
+                </a:solidFill>
+              </a:rPr>
+              <a:t>percent_arrested</a:t>
+            </a:r>
+            <a:r>
+              <a:rPr lang="en-US" sz="1600" dirty="0">
+                <a:solidFill>
+                  <a:schemeClr val="tx1"/>
+                </a:solidFill>
+              </a:rPr>
+              <a:t> = sum(</a:t>
+            </a:r>
+            <a:r>
+              <a:rPr lang="en-US" sz="1600" dirty="0" err="1">
+                <a:solidFill>
+                  <a:schemeClr val="tx1"/>
+                </a:solidFill>
+              </a:rPr>
+              <a:t>arstmade</a:t>
+            </a:r>
+            <a:r>
+              <a:rPr lang="en-US" sz="1600" dirty="0">
+                <a:solidFill>
+                  <a:schemeClr val="tx1"/>
+                </a:solidFill>
+              </a:rPr>
+              <a:t>)/ </a:t>
+            </a:r>
+            <a:r>
+              <a:rPr lang="en-US" sz="1600" dirty="0" err="1">
+                <a:solidFill>
+                  <a:schemeClr val="tx1"/>
+                </a:solidFill>
+              </a:rPr>
+              <a:t>stops_by_race</a:t>
+            </a:r>
+            <a:r>
+              <a:rPr lang="en-US" sz="1600" dirty="0">
+                <a:solidFill>
+                  <a:schemeClr val="tx1"/>
+                </a:solidFill>
+              </a:rPr>
+              <a:t> ) *100</a:t>
+            </a:r>
+          </a:p>
+          <a:p>
+            <a:r>
+              <a:rPr lang="en-US" sz="1600" dirty="0">
+                <a:solidFill>
+                  <a:schemeClr val="tx1"/>
+                </a:solidFill>
+              </a:rPr>
+              <a:t>  )|&gt;</a:t>
+            </a:r>
+          </a:p>
+          <a:p>
+            <a:r>
+              <a:rPr lang="en-US" sz="1600" dirty="0" err="1">
+                <a:solidFill>
+                  <a:schemeClr val="tx1"/>
+                </a:solidFill>
+              </a:rPr>
+              <a:t>ggplot</a:t>
+            </a:r>
+            <a:r>
+              <a:rPr lang="en-US" sz="1600" dirty="0">
+                <a:solidFill>
+                  <a:schemeClr val="tx1"/>
+                </a:solidFill>
+              </a:rPr>
+              <a:t>(</a:t>
+            </a:r>
+            <a:r>
+              <a:rPr lang="en-US" sz="1600" dirty="0" err="1">
+                <a:solidFill>
+                  <a:schemeClr val="tx1"/>
+                </a:solidFill>
+              </a:rPr>
+              <a:t>aes</a:t>
+            </a:r>
+            <a:r>
+              <a:rPr lang="en-US" sz="1600" dirty="0">
+                <a:solidFill>
+                  <a:schemeClr val="tx1"/>
+                </a:solidFill>
+              </a:rPr>
+              <a:t>(x=</a:t>
+            </a:r>
+            <a:r>
+              <a:rPr lang="en-US" sz="1600" dirty="0" err="1">
+                <a:solidFill>
+                  <a:schemeClr val="tx1"/>
+                </a:solidFill>
+              </a:rPr>
+              <a:t>race,y</a:t>
+            </a:r>
+            <a:r>
+              <a:rPr lang="en-US" sz="1600" dirty="0">
+                <a:solidFill>
+                  <a:schemeClr val="tx1"/>
+                </a:solidFill>
+              </a:rPr>
+              <a:t>=</a:t>
+            </a:r>
+            <a:r>
+              <a:rPr lang="en-US" sz="1600" dirty="0" err="1">
+                <a:solidFill>
+                  <a:schemeClr val="tx1"/>
+                </a:solidFill>
+              </a:rPr>
+              <a:t>percent_stopped</a:t>
+            </a:r>
+            <a:r>
+              <a:rPr lang="en-US" sz="1600" dirty="0">
+                <a:solidFill>
+                  <a:schemeClr val="tx1"/>
+                </a:solidFill>
+              </a:rPr>
+              <a:t>)) +</a:t>
+            </a:r>
+          </a:p>
+          <a:p>
+            <a:r>
+              <a:rPr lang="en-US" sz="1600" dirty="0">
+                <a:solidFill>
+                  <a:schemeClr val="tx1"/>
+                </a:solidFill>
+              </a:rPr>
+              <a:t>  </a:t>
+            </a:r>
+            <a:r>
+              <a:rPr lang="en-US" sz="1600" dirty="0" err="1">
+                <a:solidFill>
+                  <a:schemeClr val="tx1"/>
+                </a:solidFill>
+              </a:rPr>
+              <a:t>geom_col</a:t>
+            </a:r>
+            <a:r>
+              <a:rPr lang="en-US" sz="1600" dirty="0">
+                <a:solidFill>
+                  <a:schemeClr val="tx1"/>
+                </a:solidFill>
+              </a:rPr>
+              <a:t>(fill="red")+</a:t>
+            </a:r>
+          </a:p>
+          <a:p>
+            <a:r>
+              <a:rPr lang="en-US" sz="1600" dirty="0">
+                <a:solidFill>
+                  <a:schemeClr val="tx1"/>
+                </a:solidFill>
+              </a:rPr>
+              <a:t>  </a:t>
+            </a:r>
+            <a:r>
+              <a:rPr lang="en-US" sz="1600" dirty="0" err="1">
+                <a:solidFill>
+                  <a:schemeClr val="tx1"/>
+                </a:solidFill>
+              </a:rPr>
+              <a:t>theme_minimal</a:t>
+            </a:r>
+            <a:r>
+              <a:rPr lang="en-US" sz="1600" dirty="0">
+                <a:solidFill>
+                  <a:schemeClr val="tx1"/>
+                </a:solidFill>
+              </a:rPr>
+              <a:t>()</a:t>
+            </a:r>
+          </a:p>
+        </p:txBody>
+      </p:sp>
+    </p:spTree>
+    <p:extLst>
+      <p:ext uri="{BB962C8B-B14F-4D97-AF65-F5344CB8AC3E}">
+        <p14:creationId xmlns:p14="http://schemas.microsoft.com/office/powerpoint/2010/main" val="3295169921"/>
+      </p:ext>
+    </p:extLst>
+  </p:cSld>
+  <p:clrMapOvr>
+    <a:masterClrMapping/>
+  </p:clrMapOvr>
+</p:sld>
+</file>
+
+<file path=ppt/slides/slide5.xml><?xml version="1.0" encoding="utf-8"?>
+<p:sld xmlns:a="http://schemas.openxmlformats.org/drawingml/2006/main" xmlns:r="http://schemas.openxmlformats.org/officeDocument/2006/relationships" xmlns:p="http://schemas.openxmlformats.org/presentationml/2006/main">
+  <p:cSld>
+    <p:spTree>
+      <p:nvGrpSpPr>
+        <p:cNvPr id="1" name=""/>
+        <p:cNvGrpSpPr/>
+        <p:nvPr/>
+      </p:nvGrpSpPr>
+      <p:grpSpPr>
+        <a:xfrm>
+          <a:off x="0" y="0"/>
+          <a:ext cx="0" cy="0"/>
+          <a:chOff x="0" y="0"/>
+          <a:chExt cx="0" cy="0"/>
+        </a:xfrm>
+      </p:grpSpPr>
+      <p:sp>
+        <p:nvSpPr>
+          <p:cNvPr id="4" name="Right Arrow 3">
+            <a:extLst>
+              <a:ext uri="{FF2B5EF4-FFF2-40B4-BE49-F238E27FC236}">
+                <a16:creationId xmlns:a16="http://schemas.microsoft.com/office/drawing/2014/main" id="{CFC69BD4-1195-1E27-5F60-FB40BC15E428}"/>
               </a:ext>
             </a:extLst>
           </p:cNvPr>
@@ -4305,8 +5130,8 @@
         </p:nvSpPr>
         <p:spPr>
           <a:xfrm>
-            <a:off x="571209" y="3240817"/>
-            <a:ext cx="3744117" cy="3161379"/>
+            <a:off x="554183" y="112542"/>
+            <a:ext cx="11347086" cy="6625883"/>
           </a:xfrm>
           <a:prstGeom prst="rightArrow">
             <a:avLst/>
@@ -4338,152 +5163,514 @@
           <a:lstStyle/>
           <a:p>
             <a:r>
-              <a:rPr lang="en-US" dirty="0">
-                <a:solidFill>
-                  <a:schemeClr val="tx1"/>
-                </a:solidFill>
-              </a:rPr>
-              <a:t>mutate(</a:t>
-            </a:r>
-          </a:p>
-          <a:p>
-            <a:r>
-              <a:rPr lang="en-US" dirty="0">
-                <a:solidFill>
-                  <a:schemeClr val="tx1"/>
-                </a:solidFill>
-              </a:rPr>
-              <a:t>data = sqf_2021, percentage = total/sum(total) * 100 ) </a:t>
-            </a:r>
-          </a:p>
-        </p:txBody>
-      </p:sp>
-      <p:sp>
-        <p:nvSpPr>
-          <p:cNvPr id="12" name="Right Arrow 11">
-            <a:extLst>
-              <a:ext uri="{FF2B5EF4-FFF2-40B4-BE49-F238E27FC236}">
-                <a16:creationId xmlns:a16="http://schemas.microsoft.com/office/drawing/2014/main" id="{8B0B862E-F573-18DA-2578-5A4E38F6DE69}"/>
-              </a:ext>
-            </a:extLst>
-          </p:cNvPr>
-          <p:cNvSpPr/>
-          <p:nvPr/>
-        </p:nvSpPr>
-        <p:spPr>
-          <a:xfrm>
-            <a:off x="6341501" y="224590"/>
-            <a:ext cx="3519527" cy="2736660"/>
-          </a:xfrm>
-          <a:prstGeom prst="rightArrow">
-            <a:avLst/>
-          </a:prstGeom>
-          <a:solidFill>
-            <a:schemeClr val="bg1">
-              <a:lumMod val="75000"/>
-            </a:schemeClr>
-          </a:solidFill>
-        </p:spPr>
-        <p:style>
-          <a:lnRef idx="2">
-            <a:schemeClr val="accent1">
-              <a:shade val="50000"/>
-            </a:schemeClr>
-          </a:lnRef>
-          <a:fillRef idx="1">
-            <a:schemeClr val="accent1"/>
-          </a:fillRef>
-          <a:effectRef idx="0">
-            <a:schemeClr val="accent1"/>
-          </a:effectRef>
-          <a:fontRef idx="minor">
-            <a:schemeClr val="lt1"/>
-          </a:fontRef>
-        </p:style>
-        <p:txBody>
-          <a:bodyPr rtlCol="0" anchor="ctr"/>
-          <a:lstStyle/>
-          <a:p>
-            <a:r>
-              <a:rPr lang="en-US" dirty="0">
-                <a:solidFill>
-                  <a:schemeClr val="tx1"/>
-                </a:solidFill>
-              </a:rPr>
-              <a:t>arrange(data =sqf_2021 desc(percentage))</a:t>
-            </a:r>
-          </a:p>
-        </p:txBody>
-      </p:sp>
-      <p:sp>
-        <p:nvSpPr>
-          <p:cNvPr id="2" name="Right Arrow 1">
-            <a:extLst>
-              <a:ext uri="{FF2B5EF4-FFF2-40B4-BE49-F238E27FC236}">
-                <a16:creationId xmlns:a16="http://schemas.microsoft.com/office/drawing/2014/main" id="{983EF8F8-04A8-7491-672E-0252D03E7A31}"/>
-              </a:ext>
-            </a:extLst>
-          </p:cNvPr>
-          <p:cNvSpPr/>
-          <p:nvPr/>
-        </p:nvSpPr>
-        <p:spPr>
-          <a:xfrm>
-            <a:off x="6079138" y="3487321"/>
-            <a:ext cx="4044251" cy="2914875"/>
-          </a:xfrm>
-          <a:prstGeom prst="rightArrow">
-            <a:avLst/>
-          </a:prstGeom>
-          <a:solidFill>
-            <a:schemeClr val="bg1">
-              <a:lumMod val="75000"/>
-            </a:schemeClr>
-          </a:solidFill>
-        </p:spPr>
-        <p:style>
-          <a:lnRef idx="2">
-            <a:schemeClr val="accent1">
-              <a:shade val="50000"/>
-            </a:schemeClr>
-          </a:lnRef>
-          <a:fillRef idx="1">
-            <a:schemeClr val="accent1"/>
-          </a:fillRef>
-          <a:effectRef idx="0">
-            <a:schemeClr val="accent1"/>
-          </a:effectRef>
-          <a:fontRef idx="minor">
-            <a:schemeClr val="lt1"/>
-          </a:fontRef>
-        </p:style>
-        <p:txBody>
-          <a:bodyPr rtlCol="0" anchor="ctr"/>
-          <a:lstStyle/>
-          <a:p>
-            <a:r>
-              <a:rPr lang="en-US" dirty="0">
-                <a:solidFill>
-                  <a:schemeClr val="tx1"/>
-                </a:solidFill>
-              </a:rPr>
-              <a:t>names(sqf_2021) &lt;- c("</a:t>
-            </a:r>
-            <a:r>
-              <a:rPr lang="en-US" dirty="0" err="1">
-                <a:solidFill>
-                  <a:schemeClr val="tx1"/>
-                </a:solidFill>
-              </a:rPr>
-              <a:t>sex","race","age</a:t>
-            </a:r>
-            <a:r>
-              <a:rPr lang="en-US" dirty="0">
-                <a:solidFill>
-                  <a:schemeClr val="tx1"/>
-                </a:solidFill>
-              </a:rPr>
-              <a:t>") </a:t>
+              <a:rPr lang="en-US" sz="1400" dirty="0">
+                <a:solidFill>
+                  <a:schemeClr val="tx1"/>
+                </a:solidFill>
+              </a:rPr>
+              <a:t>sqf_2011 |&gt; </a:t>
+            </a:r>
+          </a:p>
+          <a:p>
+            <a:r>
+              <a:rPr lang="en-US" sz="1400" dirty="0">
+                <a:solidFill>
+                  <a:schemeClr val="tx1"/>
+                </a:solidFill>
+              </a:rPr>
+              <a:t>  </a:t>
+            </a:r>
+            <a:r>
+              <a:rPr lang="en-US" sz="1400" dirty="0" err="1">
+                <a:solidFill>
+                  <a:schemeClr val="tx1"/>
+                </a:solidFill>
+              </a:rPr>
+              <a:t>group_by</a:t>
+            </a:r>
+            <a:r>
+              <a:rPr lang="en-US" sz="1400" dirty="0">
+                <a:solidFill>
+                  <a:schemeClr val="tx1"/>
+                </a:solidFill>
+              </a:rPr>
+              <a:t>(race) |&gt;</a:t>
+            </a:r>
+          </a:p>
+          <a:p>
+            <a:r>
+              <a:rPr lang="en-US" sz="1400" dirty="0">
+                <a:solidFill>
+                  <a:schemeClr val="tx1"/>
+                </a:solidFill>
+              </a:rPr>
+              <a:t>  </a:t>
+            </a:r>
+            <a:r>
+              <a:rPr lang="en-US" sz="1400" dirty="0" err="1">
+                <a:solidFill>
+                  <a:schemeClr val="tx1"/>
+                </a:solidFill>
+              </a:rPr>
+              <a:t>summarise</a:t>
+            </a:r>
+            <a:r>
+              <a:rPr lang="en-US" sz="1400" dirty="0">
+                <a:solidFill>
+                  <a:schemeClr val="tx1"/>
+                </a:solidFill>
+              </a:rPr>
+              <a:t>(</a:t>
+            </a:r>
+            <a:r>
+              <a:rPr lang="en-US" sz="1400" dirty="0" err="1">
+                <a:solidFill>
+                  <a:schemeClr val="tx1"/>
+                </a:solidFill>
+              </a:rPr>
+              <a:t>stops_by_race</a:t>
+            </a:r>
+            <a:r>
+              <a:rPr lang="en-US" sz="1400" dirty="0">
+                <a:solidFill>
+                  <a:schemeClr val="tx1"/>
+                </a:solidFill>
+              </a:rPr>
+              <a:t> = n(),</a:t>
+            </a:r>
+          </a:p>
+          <a:p>
+            <a:r>
+              <a:rPr lang="en-US" sz="1400" dirty="0">
+                <a:solidFill>
+                  <a:schemeClr val="tx1"/>
+                </a:solidFill>
+              </a:rPr>
+              <a:t>            </a:t>
+            </a:r>
+            <a:r>
+              <a:rPr lang="en-US" sz="1400" dirty="0" err="1">
+                <a:solidFill>
+                  <a:schemeClr val="tx1"/>
+                </a:solidFill>
+              </a:rPr>
+              <a:t>percent_stopped</a:t>
+            </a:r>
+            <a:r>
+              <a:rPr lang="en-US" sz="1400" dirty="0">
+                <a:solidFill>
+                  <a:schemeClr val="tx1"/>
+                </a:solidFill>
+              </a:rPr>
+              <a:t> = </a:t>
+            </a:r>
+            <a:r>
+              <a:rPr lang="en-US" sz="1400" dirty="0" err="1">
+                <a:solidFill>
+                  <a:schemeClr val="tx1"/>
+                </a:solidFill>
+              </a:rPr>
+              <a:t>stops_by_race</a:t>
+            </a:r>
+            <a:r>
+              <a:rPr lang="en-US" sz="1400" dirty="0">
+                <a:solidFill>
+                  <a:schemeClr val="tx1"/>
+                </a:solidFill>
+              </a:rPr>
+              <a:t> / </a:t>
+            </a:r>
+            <a:r>
+              <a:rPr lang="en-US" sz="1400" dirty="0" err="1">
+                <a:solidFill>
+                  <a:schemeClr val="tx1"/>
+                </a:solidFill>
+              </a:rPr>
+              <a:t>total_stops</a:t>
+            </a:r>
+            <a:r>
+              <a:rPr lang="en-US" sz="1400" dirty="0">
+                <a:solidFill>
+                  <a:schemeClr val="tx1"/>
+                </a:solidFill>
+              </a:rPr>
+              <a:t> *100,</a:t>
+            </a:r>
+          </a:p>
+          <a:p>
+            <a:r>
+              <a:rPr lang="en-US" sz="1400" dirty="0">
+                <a:solidFill>
+                  <a:schemeClr val="tx1"/>
+                </a:solidFill>
+              </a:rPr>
+              <a:t>            </a:t>
+            </a:r>
+            <a:r>
+              <a:rPr lang="en-US" sz="1400" dirty="0" err="1">
+                <a:solidFill>
+                  <a:schemeClr val="tx1"/>
+                </a:solidFill>
+              </a:rPr>
+              <a:t>percent_arrested</a:t>
+            </a:r>
+            <a:r>
+              <a:rPr lang="en-US" sz="1400" dirty="0">
+                <a:solidFill>
+                  <a:schemeClr val="tx1"/>
+                </a:solidFill>
+              </a:rPr>
+              <a:t> = sum(</a:t>
+            </a:r>
+            <a:r>
+              <a:rPr lang="en-US" sz="1400" dirty="0" err="1">
+                <a:solidFill>
+                  <a:schemeClr val="tx1"/>
+                </a:solidFill>
+              </a:rPr>
+              <a:t>arstmade</a:t>
+            </a:r>
+            <a:r>
+              <a:rPr lang="en-US" sz="1400" dirty="0">
+                <a:solidFill>
+                  <a:schemeClr val="tx1"/>
+                </a:solidFill>
+              </a:rPr>
+              <a:t>)/ </a:t>
+            </a:r>
+            <a:r>
+              <a:rPr lang="en-US" sz="1400" dirty="0" err="1">
+                <a:solidFill>
+                  <a:schemeClr val="tx1"/>
+                </a:solidFill>
+              </a:rPr>
+              <a:t>stops_by_race</a:t>
+            </a:r>
+            <a:r>
+              <a:rPr lang="en-US" sz="1400" dirty="0">
+                <a:solidFill>
+                  <a:schemeClr val="tx1"/>
+                </a:solidFill>
+              </a:rPr>
+              <a:t> *100</a:t>
+            </a:r>
+          </a:p>
+          <a:p>
+            <a:r>
+              <a:rPr lang="en-US" sz="1400" dirty="0">
+                <a:solidFill>
+                  <a:schemeClr val="tx1"/>
+                </a:solidFill>
+              </a:rPr>
+              <a:t>  )|&gt;</a:t>
+            </a:r>
+          </a:p>
+          <a:p>
+            <a:r>
+              <a:rPr lang="en-US" sz="1400" dirty="0">
+                <a:solidFill>
+                  <a:schemeClr val="tx1"/>
+                </a:solidFill>
+              </a:rPr>
+              <a:t>  arrange(</a:t>
+            </a:r>
+            <a:r>
+              <a:rPr lang="en-US" sz="1400" dirty="0" err="1">
+                <a:solidFill>
+                  <a:schemeClr val="tx1"/>
+                </a:solidFill>
+              </a:rPr>
+              <a:t>percent_arrested</a:t>
+            </a:r>
+            <a:r>
+              <a:rPr lang="en-US" sz="1400" dirty="0">
+                <a:solidFill>
+                  <a:schemeClr val="tx1"/>
+                </a:solidFill>
+              </a:rPr>
+              <a:t>) |&gt;</a:t>
+            </a:r>
+          </a:p>
+          <a:p>
+            <a:r>
+              <a:rPr lang="en-US" sz="1400" dirty="0">
+                <a:solidFill>
+                  <a:schemeClr val="tx1"/>
+                </a:solidFill>
+              </a:rPr>
+              <a:t>  </a:t>
+            </a:r>
+            <a:r>
+              <a:rPr lang="en-US" sz="1400" dirty="0" err="1">
+                <a:solidFill>
+                  <a:schemeClr val="tx1"/>
+                </a:solidFill>
+              </a:rPr>
+              <a:t>ggplot</a:t>
+            </a:r>
+            <a:r>
+              <a:rPr lang="en-US" sz="1400" dirty="0">
+                <a:solidFill>
+                  <a:schemeClr val="tx1"/>
+                </a:solidFill>
+              </a:rPr>
+              <a:t>()+</a:t>
+            </a:r>
+          </a:p>
+          <a:p>
+            <a:r>
+              <a:rPr lang="en-US" sz="1400" dirty="0">
+                <a:solidFill>
+                  <a:schemeClr val="tx1"/>
+                </a:solidFill>
+              </a:rPr>
+              <a:t>  </a:t>
+            </a:r>
+            <a:r>
+              <a:rPr lang="en-US" sz="1400" dirty="0" err="1">
+                <a:solidFill>
+                  <a:schemeClr val="tx1"/>
+                </a:solidFill>
+              </a:rPr>
+              <a:t>geom_col</a:t>
+            </a:r>
+            <a:r>
+              <a:rPr lang="en-US" sz="1400" dirty="0">
+                <a:solidFill>
+                  <a:schemeClr val="tx1"/>
+                </a:solidFill>
+              </a:rPr>
+              <a:t>(</a:t>
+            </a:r>
+            <a:r>
+              <a:rPr lang="en-US" sz="1400" dirty="0" err="1">
+                <a:solidFill>
+                  <a:schemeClr val="tx1"/>
+                </a:solidFill>
+              </a:rPr>
+              <a:t>aes</a:t>
+            </a:r>
+            <a:r>
+              <a:rPr lang="en-US" sz="1400" dirty="0">
+                <a:solidFill>
+                  <a:schemeClr val="tx1"/>
+                </a:solidFill>
+              </a:rPr>
+              <a:t>(x=</a:t>
+            </a:r>
+            <a:r>
+              <a:rPr lang="en-US" sz="1400" dirty="0" err="1">
+                <a:solidFill>
+                  <a:schemeClr val="tx1"/>
+                </a:solidFill>
+              </a:rPr>
+              <a:t>race,y</a:t>
+            </a:r>
+            <a:r>
+              <a:rPr lang="en-US" sz="1400" dirty="0">
+                <a:solidFill>
+                  <a:schemeClr val="tx1"/>
+                </a:solidFill>
+              </a:rPr>
+              <a:t>=</a:t>
+            </a:r>
+            <a:r>
+              <a:rPr lang="en-US" sz="1400" dirty="0" err="1">
+                <a:solidFill>
+                  <a:schemeClr val="tx1"/>
+                </a:solidFill>
+              </a:rPr>
+              <a:t>percent_arrested</a:t>
+            </a:r>
+            <a:r>
+              <a:rPr lang="en-US" sz="1400" dirty="0">
+                <a:solidFill>
+                  <a:schemeClr val="tx1"/>
+                </a:solidFill>
+              </a:rPr>
+              <a:t>),   fill="blue", width = 0.25, position = </a:t>
+            </a:r>
+            <a:r>
+              <a:rPr lang="en-US" sz="1400" dirty="0" err="1">
+                <a:solidFill>
+                  <a:schemeClr val="tx1"/>
+                </a:solidFill>
+              </a:rPr>
+              <a:t>position_nudge</a:t>
+            </a:r>
+            <a:r>
+              <a:rPr lang="en-US" sz="1400" dirty="0">
+                <a:solidFill>
+                  <a:schemeClr val="tx1"/>
+                </a:solidFill>
+              </a:rPr>
+              <a:t>(x=0.15))+</a:t>
+            </a:r>
+          </a:p>
+          <a:p>
+            <a:r>
+              <a:rPr lang="en-US" sz="1400" dirty="0">
+                <a:solidFill>
+                  <a:schemeClr val="tx1"/>
+                </a:solidFill>
+              </a:rPr>
+              <a:t>  </a:t>
+            </a:r>
+            <a:r>
+              <a:rPr lang="en-US" sz="1400" dirty="0" err="1">
+                <a:solidFill>
+                  <a:schemeClr val="tx1"/>
+                </a:solidFill>
+              </a:rPr>
+              <a:t>geom_col</a:t>
+            </a:r>
+            <a:r>
+              <a:rPr lang="en-US" sz="1400" dirty="0">
+                <a:solidFill>
+                  <a:schemeClr val="tx1"/>
+                </a:solidFill>
+              </a:rPr>
+              <a:t>(</a:t>
+            </a:r>
+            <a:r>
+              <a:rPr lang="en-US" sz="1400" dirty="0" err="1">
+                <a:solidFill>
+                  <a:schemeClr val="tx1"/>
+                </a:solidFill>
+              </a:rPr>
+              <a:t>aes</a:t>
+            </a:r>
+            <a:r>
+              <a:rPr lang="en-US" sz="1400" dirty="0">
+                <a:solidFill>
+                  <a:schemeClr val="tx1"/>
+                </a:solidFill>
+              </a:rPr>
+              <a:t>(x=</a:t>
+            </a:r>
+            <a:r>
+              <a:rPr lang="en-US" sz="1400" dirty="0" err="1">
+                <a:solidFill>
+                  <a:schemeClr val="tx1"/>
+                </a:solidFill>
+              </a:rPr>
+              <a:t>race,y</a:t>
+            </a:r>
+            <a:r>
+              <a:rPr lang="en-US" sz="1400" dirty="0">
+                <a:solidFill>
+                  <a:schemeClr val="tx1"/>
+                </a:solidFill>
+              </a:rPr>
+              <a:t>=</a:t>
+            </a:r>
+            <a:r>
+              <a:rPr lang="en-US" sz="1400" dirty="0" err="1">
+                <a:solidFill>
+                  <a:schemeClr val="tx1"/>
+                </a:solidFill>
+              </a:rPr>
+              <a:t>percent_stopped</a:t>
+            </a:r>
+            <a:r>
+              <a:rPr lang="en-US" sz="1400" dirty="0">
+                <a:solidFill>
+                  <a:schemeClr val="tx1"/>
+                </a:solidFill>
+              </a:rPr>
+              <a:t>), fill="red", width = 0.25, position = </a:t>
+            </a:r>
+            <a:r>
+              <a:rPr lang="en-US" sz="1400" dirty="0" err="1">
+                <a:solidFill>
+                  <a:schemeClr val="tx1"/>
+                </a:solidFill>
+              </a:rPr>
+              <a:t>position_nudge</a:t>
+            </a:r>
+            <a:r>
+              <a:rPr lang="en-US" sz="1400" dirty="0">
+                <a:solidFill>
+                  <a:schemeClr val="tx1"/>
+                </a:solidFill>
+              </a:rPr>
+              <a:t>(x=-0.15))+</a:t>
+            </a:r>
+          </a:p>
+          <a:p>
+            <a:r>
+              <a:rPr lang="en-US" sz="1400" dirty="0">
+                <a:solidFill>
+                  <a:schemeClr val="tx1"/>
+                </a:solidFill>
+              </a:rPr>
+              <a:t>  labs(</a:t>
+            </a:r>
+          </a:p>
+          <a:p>
+            <a:r>
+              <a:rPr lang="en-US" sz="1400" dirty="0">
+                <a:solidFill>
+                  <a:schemeClr val="tx1"/>
+                </a:solidFill>
+              </a:rPr>
+              <a:t>        y="", </a:t>
+            </a:r>
+          </a:p>
+          <a:p>
+            <a:r>
+              <a:rPr lang="en-US" sz="1400" dirty="0">
+                <a:solidFill>
+                  <a:schemeClr val="tx1"/>
+                </a:solidFill>
+              </a:rPr>
+              <a:t>       title = "Percent Stopped and Percent Arrested",</a:t>
+            </a:r>
+          </a:p>
+          <a:p>
+            <a:r>
+              <a:rPr lang="en-US" sz="1400" dirty="0">
+                <a:solidFill>
+                  <a:schemeClr val="tx1"/>
+                </a:solidFill>
+              </a:rPr>
+              <a:t>       subtitle = "NYC SQF 2011 Data",</a:t>
+            </a:r>
+          </a:p>
+          <a:p>
+            <a:r>
+              <a:rPr lang="en-US" sz="1400" dirty="0">
+                <a:solidFill>
+                  <a:schemeClr val="tx1"/>
+                </a:solidFill>
+              </a:rPr>
+              <a:t>       caption = "The red bars show percent of people stopped of the total.\n The blue bars show the percent arrested by stop.")+</a:t>
+            </a:r>
+          </a:p>
+          <a:p>
+            <a:r>
+              <a:rPr lang="en-US" sz="1400" dirty="0">
+                <a:solidFill>
+                  <a:schemeClr val="tx1"/>
+                </a:solidFill>
+              </a:rPr>
+              <a:t>  </a:t>
+            </a:r>
+            <a:r>
+              <a:rPr lang="en-US" sz="1400" dirty="0" err="1">
+                <a:solidFill>
+                  <a:schemeClr val="tx1"/>
+                </a:solidFill>
+              </a:rPr>
+              <a:t>theme_minimal</a:t>
+            </a:r>
+            <a:r>
+              <a:rPr lang="en-US" sz="1400" dirty="0">
+                <a:solidFill>
+                  <a:schemeClr val="tx1"/>
+                </a:solidFill>
+              </a:rPr>
+              <a:t>()</a:t>
             </a:r>
           </a:p>
         </p:txBody>
@@ -4491,7 +5678,7 @@
     </p:spTree>
     <p:extLst>
       <p:ext uri="{BB962C8B-B14F-4D97-AF65-F5344CB8AC3E}">
-        <p14:creationId xmlns:p14="http://schemas.microsoft.com/office/powerpoint/2010/main" val="3295169921"/>
+        <p14:creationId xmlns:p14="http://schemas.microsoft.com/office/powerpoint/2010/main" val="1773903766"/>
       </p:ext>
     </p:extLst>
   </p:cSld>

</xml_diff>